<commit_message>
Final version of slides for 5/6
</commit_message>
<xml_diff>
--- a/Documentation/Meetings/capstone_meeting_5-06-15.pptx
+++ b/Documentation/Meetings/capstone_meeting_5-06-15.pptx
@@ -5,17 +5,17 @@
     <p:sldMasterId id="2147483648" r:id="rId2"/>
     <p:sldMasterId id="2147483661" r:id="rId3"/>
     <p:sldMasterId id="2147483674" r:id="rId4"/>
-    <p:sldMasterId id="2147483687" r:id="rId5"/>
   </p:sldMasterIdLst>
   <p:notesMasterIdLst>
-    <p:notesMasterId r:id="rId6"/>
+    <p:notesMasterId r:id="rId5"/>
   </p:notesMasterIdLst>
   <p:sldIdLst>
-    <p:sldId id="256" r:id="rId7"/>
-    <p:sldId id="257" r:id="rId8"/>
-    <p:sldId id="258" r:id="rId9"/>
-    <p:sldId id="259" r:id="rId10"/>
-    <p:sldId id="260" r:id="rId11"/>
+    <p:sldId id="256" r:id="rId6"/>
+    <p:sldId id="257" r:id="rId7"/>
+    <p:sldId id="258" r:id="rId8"/>
+    <p:sldId id="259" r:id="rId9"/>
+    <p:sldId id="260" r:id="rId10"/>
+    <p:sldId id="261" r:id="rId11"/>
   </p:sldIdLst>
   <p:sldSz cx="12192000" cy="6858000"/>
   <p:notesSz cx="6858000" cy="9144000"/>
@@ -41,7 +41,7 @@
       </p:grpSpPr>
       <p:sp>
         <p:nvSpPr>
-          <p:cNvPr id="148" name="PlaceHolder 1"/>
+          <p:cNvPr id="111" name="PlaceHolder 1"/>
           <p:cNvSpPr>
             <a:spLocks noGrp="1"/>
           </p:cNvSpPr>
@@ -73,7 +73,7 @@
       </p:sp>
       <p:sp>
         <p:nvSpPr>
-          <p:cNvPr id="149" name="PlaceHolder 2"/>
+          <p:cNvPr id="112" name="PlaceHolder 2"/>
           <p:cNvSpPr>
             <a:spLocks noGrp="1"/>
           </p:cNvSpPr>
@@ -105,7 +105,7 @@
       </p:sp>
       <p:sp>
         <p:nvSpPr>
-          <p:cNvPr id="150" name="PlaceHolder 3"/>
+          <p:cNvPr id="113" name="PlaceHolder 3"/>
           <p:cNvSpPr>
             <a:spLocks noGrp="1"/>
           </p:cNvSpPr>
@@ -138,7 +138,7 @@
       </p:sp>
       <p:sp>
         <p:nvSpPr>
-          <p:cNvPr id="151" name="PlaceHolder 4"/>
+          <p:cNvPr id="114" name="PlaceHolder 4"/>
           <p:cNvSpPr>
             <a:spLocks noGrp="1"/>
           </p:cNvSpPr>
@@ -170,7 +170,7 @@
       </p:sp>
       <p:sp>
         <p:nvSpPr>
-          <p:cNvPr id="152" name="PlaceHolder 5"/>
+          <p:cNvPr id="115" name="PlaceHolder 5"/>
           <p:cNvSpPr>
             <a:spLocks noGrp="1"/>
           </p:cNvSpPr>
@@ -191,7 +191,7 @@
           <a:bodyPr lIns="0" rIns="0" tIns="0" bIns="0" anchor="b"/>
           <a:p>
             <a:pPr algn="r"/>
-            <a:fld id="{F02B4F63-7698-4590-A287-7C754F05A8DF}" type="slidenum">
+            <a:fld id="{FF853A25-5266-4B92-AEA2-47072A31F638}" type="slidenum">
               <a:rPr lang="en-US" sz="1400">
                 <a:latin typeface="Times New Roman"/>
               </a:rPr>
@@ -226,14 +226,14 @@
       </p:grpSpPr>
       <p:sp>
         <p:nvSpPr>
-          <p:cNvPr id="173" name="CustomShape 1"/>
+          <p:cNvPr id="139" name="CustomShape 1"/>
           <p:cNvSpPr/>
           <p:nvPr/>
         </p:nvSpPr>
         <p:spPr>
           <a:xfrm>
             <a:off x="3884760" y="8685360"/>
-            <a:ext cx="2971080" cy="457920"/>
+            <a:ext cx="2970720" cy="457560"/>
           </a:xfrm>
           <a:prstGeom prst="rect">
             <a:avLst/>
@@ -251,7 +251,7 @@
                 <a:spcPct val="100000"/>
               </a:lnSpc>
             </a:pPr>
-            <a:fld id="{3C781B00-5B61-4F6F-B11C-6E14BAD3177D}" type="slidenum">
+            <a:fld id="{9E7AA541-8A7C-49BE-9908-DB02FA1C7C3E}" type="slidenum">
               <a:rPr lang="en-US" sz="1200">
                 <a:solidFill>
                   <a:srgbClr val="000000"/>
@@ -267,14 +267,14 @@
       </p:sp>
       <p:sp>
         <p:nvSpPr>
-          <p:cNvPr id="174" name="CustomShape 2"/>
+          <p:cNvPr id="140" name="CustomShape 2"/>
           <p:cNvSpPr/>
           <p:nvPr/>
         </p:nvSpPr>
         <p:spPr>
           <a:xfrm>
             <a:off x="3886200" y="8686800"/>
-            <a:ext cx="2971080" cy="456480"/>
+            <a:ext cx="2970720" cy="456120"/>
           </a:xfrm>
           <a:prstGeom prst="rect">
             <a:avLst/>
@@ -292,7 +292,7 @@
                 <a:spcPct val="100000"/>
               </a:lnSpc>
             </a:pPr>
-            <a:fld id="{020B8EC5-F41C-4524-AA9A-96ABBD2CF2AA}" type="slidenum">
+            <a:fld id="{7D6C8427-C1D7-448E-A2DD-AC172FD43D60}" type="slidenum">
               <a:rPr lang="en-US" sz="1200">
                 <a:solidFill>
                   <a:srgbClr val="000000"/>
@@ -308,14 +308,14 @@
       </p:sp>
       <p:sp>
         <p:nvSpPr>
-          <p:cNvPr id="175" name="CustomShape 3"/>
+          <p:cNvPr id="141" name="CustomShape 3"/>
           <p:cNvSpPr/>
           <p:nvPr/>
         </p:nvSpPr>
         <p:spPr>
           <a:xfrm>
             <a:off x="914400" y="4343400"/>
-            <a:ext cx="5028480" cy="4114080"/>
+            <a:ext cx="5028120" cy="4113720"/>
           </a:xfrm>
           <a:prstGeom prst="rect">
             <a:avLst/>
@@ -336,7 +336,7 @@
 </p:notes>
 </file>
 
-<file path=ppt/notesSlides/notesSlide5.xml><?xml version="1.0" encoding="utf-8"?>
+<file path=ppt/notesSlides/notesSlide6.xml><?xml version="1.0" encoding="utf-8"?>
 <p:notes xmlns:a="http://schemas.openxmlformats.org/drawingml/2006/main" xmlns:p="http://schemas.openxmlformats.org/presentationml/2006/main" xmlns:r="http://schemas.openxmlformats.org/officeDocument/2006/relationships">
   <p:cSld>
     <p:spTree>
@@ -355,14 +355,14 @@
       </p:grpSpPr>
       <p:sp>
         <p:nvSpPr>
-          <p:cNvPr id="176" name="CustomShape 1"/>
+          <p:cNvPr id="142" name="CustomShape 1"/>
           <p:cNvSpPr/>
           <p:nvPr/>
         </p:nvSpPr>
         <p:spPr>
           <a:xfrm>
             <a:off x="3884760" y="8685360"/>
-            <a:ext cx="2971080" cy="457920"/>
+            <a:ext cx="2970720" cy="457560"/>
           </a:xfrm>
           <a:prstGeom prst="rect">
             <a:avLst/>
@@ -380,7 +380,7 @@
                 <a:spcPct val="100000"/>
               </a:lnSpc>
             </a:pPr>
-            <a:fld id="{7E5B6FE0-FC04-4FFD-ACB1-40CE57C2882A}" type="slidenum">
+            <a:fld id="{28BD7AFC-A56D-4A59-8B18-98CB37649552}" type="slidenum">
               <a:rPr lang="en-US" sz="1200">
                 <a:solidFill>
                   <a:srgbClr val="000000"/>
@@ -396,14 +396,14 @@
       </p:sp>
       <p:sp>
         <p:nvSpPr>
-          <p:cNvPr id="177" name="CustomShape 2"/>
+          <p:cNvPr id="143" name="CustomShape 2"/>
           <p:cNvSpPr/>
           <p:nvPr/>
         </p:nvSpPr>
         <p:spPr>
           <a:xfrm>
             <a:off x="914400" y="4343400"/>
-            <a:ext cx="5028480" cy="4114080"/>
+            <a:ext cx="5028120" cy="4113720"/>
           </a:xfrm>
           <a:prstGeom prst="rect">
             <a:avLst/>
@@ -480,6 +480,7 @@
         <p:txBody>
           <a:bodyPr lIns="0" rIns="0" tIns="0" bIns="0" anchor="ctr"/>
           <a:p>
+            <a:pPr algn="ctr"/>
             <a:endParaRPr/>
           </a:p>
         </p:txBody>
@@ -580,6 +581,7 @@
         <p:txBody>
           <a:bodyPr lIns="0" rIns="0" tIns="0" bIns="0" anchor="ctr"/>
           <a:p>
+            <a:pPr algn="ctr"/>
             <a:endParaRPr/>
           </a:p>
         </p:txBody>
@@ -732,6 +734,7 @@
         <p:txBody>
           <a:bodyPr lIns="0" rIns="0" tIns="0" bIns="0" anchor="ctr"/>
           <a:p>
+            <a:pPr algn="ctr"/>
             <a:endParaRPr/>
           </a:p>
         </p:txBody>
@@ -904,6 +907,7 @@
         <p:txBody>
           <a:bodyPr lIns="0" rIns="0" tIns="0" bIns="0" anchor="ctr"/>
           <a:p>
+            <a:pPr algn="ctr"/>
             <a:endParaRPr/>
           </a:p>
         </p:txBody>
@@ -979,6 +983,7 @@
         <p:txBody>
           <a:bodyPr lIns="0" rIns="0" tIns="0" bIns="0" anchor="ctr"/>
           <a:p>
+            <a:pPr algn="ctr"/>
             <a:endParaRPr/>
           </a:p>
         </p:txBody>
@@ -1053,6 +1058,7 @@
         <p:txBody>
           <a:bodyPr lIns="0" rIns="0" tIns="0" bIns="0" anchor="ctr"/>
           <a:p>
+            <a:pPr algn="ctr"/>
             <a:endParaRPr/>
           </a:p>
         </p:txBody>
@@ -1153,6 +1159,7 @@
         <p:txBody>
           <a:bodyPr lIns="0" rIns="0" tIns="0" bIns="0" anchor="ctr"/>
           <a:p>
+            <a:pPr algn="ctr"/>
             <a:endParaRPr/>
           </a:p>
         </p:txBody>
@@ -1250,6 +1257,7 @@
         <p:txBody>
           <a:bodyPr lIns="0" rIns="0" tIns="0" bIns="0" anchor="ctr"/>
           <a:p>
+            <a:pPr algn="ctr"/>
             <a:endParaRPr/>
           </a:p>
         </p:txBody>
@@ -1376,6 +1384,7 @@
         <p:txBody>
           <a:bodyPr lIns="0" rIns="0" tIns="0" bIns="0" anchor="ctr"/>
           <a:p>
+            <a:pPr algn="ctr"/>
             <a:endParaRPr/>
           </a:p>
         </p:txBody>
@@ -1451,6 +1460,7 @@
         <p:txBody>
           <a:bodyPr lIns="0" rIns="0" tIns="0" bIns="0" anchor="ctr"/>
           <a:p>
+            <a:pPr algn="ctr"/>
             <a:endParaRPr/>
           </a:p>
         </p:txBody>
@@ -1577,6 +1587,7 @@
         <p:txBody>
           <a:bodyPr lIns="0" rIns="0" tIns="0" bIns="0" anchor="ctr"/>
           <a:p>
+            <a:pPr algn="ctr"/>
             <a:endParaRPr/>
           </a:p>
         </p:txBody>
@@ -1703,6 +1714,7 @@
         <p:txBody>
           <a:bodyPr lIns="0" rIns="0" tIns="0" bIns="0" anchor="ctr"/>
           <a:p>
+            <a:pPr algn="ctr"/>
             <a:endParaRPr/>
           </a:p>
         </p:txBody>
@@ -1803,6 +1815,7 @@
         <p:txBody>
           <a:bodyPr lIns="0" rIns="0" tIns="0" bIns="0" anchor="ctr"/>
           <a:p>
+            <a:pPr algn="ctr"/>
             <a:endParaRPr/>
           </a:p>
         </p:txBody>
@@ -1955,6 +1968,7 @@
         <p:txBody>
           <a:bodyPr lIns="0" rIns="0" tIns="0" bIns="0" anchor="ctr"/>
           <a:p>
+            <a:pPr algn="ctr"/>
             <a:endParaRPr/>
           </a:p>
         </p:txBody>
@@ -2127,6 +2141,7 @@
         <p:txBody>
           <a:bodyPr lIns="0" rIns="0" tIns="0" bIns="0" anchor="ctr"/>
           <a:p>
+            <a:pPr algn="ctr"/>
             <a:endParaRPr/>
           </a:p>
         </p:txBody>
@@ -2202,6 +2217,7 @@
         <p:txBody>
           <a:bodyPr lIns="0" rIns="0" tIns="0" bIns="0" anchor="ctr"/>
           <a:p>
+            <a:pPr algn="ctr"/>
             <a:endParaRPr/>
           </a:p>
         </p:txBody>
@@ -2276,6 +2292,7 @@
         <p:txBody>
           <a:bodyPr lIns="0" rIns="0" tIns="0" bIns="0" anchor="ctr"/>
           <a:p>
+            <a:pPr algn="ctr"/>
             <a:endParaRPr/>
           </a:p>
         </p:txBody>
@@ -2376,6 +2393,7 @@
         <p:txBody>
           <a:bodyPr lIns="0" rIns="0" tIns="0" bIns="0" anchor="ctr"/>
           <a:p>
+            <a:pPr algn="ctr"/>
             <a:endParaRPr/>
           </a:p>
         </p:txBody>
@@ -2424,6 +2442,7 @@
         <p:txBody>
           <a:bodyPr lIns="0" rIns="0" tIns="0" bIns="0" anchor="ctr"/>
           <a:p>
+            <a:pPr algn="ctr"/>
             <a:endParaRPr/>
           </a:p>
         </p:txBody>
@@ -2547,6 +2566,7 @@
         <p:txBody>
           <a:bodyPr lIns="0" rIns="0" tIns="0" bIns="0" anchor="ctr"/>
           <a:p>
+            <a:pPr algn="ctr"/>
             <a:endParaRPr/>
           </a:p>
         </p:txBody>
@@ -2673,6 +2693,7 @@
         <p:txBody>
           <a:bodyPr lIns="0" rIns="0" tIns="0" bIns="0" anchor="ctr"/>
           <a:p>
+            <a:pPr algn="ctr"/>
             <a:endParaRPr/>
           </a:p>
         </p:txBody>
@@ -2799,6 +2820,7 @@
         <p:txBody>
           <a:bodyPr lIns="0" rIns="0" tIns="0" bIns="0" anchor="ctr"/>
           <a:p>
+            <a:pPr algn="ctr"/>
             <a:endParaRPr/>
           </a:p>
         </p:txBody>
@@ -2925,6 +2947,7 @@
         <p:txBody>
           <a:bodyPr lIns="0" rIns="0" tIns="0" bIns="0" anchor="ctr"/>
           <a:p>
+            <a:pPr algn="ctr"/>
             <a:endParaRPr/>
           </a:p>
         </p:txBody>
@@ -3025,6 +3048,7 @@
         <p:txBody>
           <a:bodyPr lIns="0" rIns="0" tIns="0" bIns="0" anchor="ctr"/>
           <a:p>
+            <a:pPr algn="ctr"/>
             <a:endParaRPr/>
           </a:p>
         </p:txBody>
@@ -3177,6 +3201,7 @@
         <p:txBody>
           <a:bodyPr lIns="0" rIns="0" tIns="0" bIns="0" anchor="ctr"/>
           <a:p>
+            <a:pPr algn="ctr"/>
             <a:endParaRPr/>
           </a:p>
         </p:txBody>
@@ -3283,177 +3308,6 @@
           </a:ln>
         </p:spPr>
       </p:pic>
-    </p:spTree>
-  </p:cSld>
-</p:sldLayout>
-</file>
-
-<file path=ppt/slideLayouts/slideLayout37.xml><?xml version="1.0" encoding="utf-8"?>
-<p:sldLayout xmlns:a="http://schemas.openxmlformats.org/drawingml/2006/main" xmlns:p="http://schemas.openxmlformats.org/presentationml/2006/main" xmlns:r="http://schemas.openxmlformats.org/officeDocument/2006/relationships" type="blank" preserve="1">
-  <p:cSld name="Blank Slide">
-    <p:spTree>
-      <p:nvGrpSpPr>
-        <p:cNvPr id="1" name=""/>
-        <p:cNvGrpSpPr/>
-        <p:nvPr/>
-      </p:nvGrpSpPr>
-      <p:grpSpPr>
-        <a:xfrm>
-          <a:off x="0" y="0"/>
-          <a:ext cx="0" cy="0"/>
-          <a:chOff x="0" y="0"/>
-          <a:chExt cx="0" cy="0"/>
-        </a:xfrm>
-      </p:grpSpPr>
-    </p:spTree>
-  </p:cSld>
-</p:sldLayout>
-</file>
-
-<file path=ppt/slideLayouts/slideLayout38.xml><?xml version="1.0" encoding="utf-8"?>
-<p:sldLayout xmlns:a="http://schemas.openxmlformats.org/drawingml/2006/main" xmlns:p="http://schemas.openxmlformats.org/presentationml/2006/main" xmlns:r="http://schemas.openxmlformats.org/officeDocument/2006/relationships" type="tx" preserve="1">
-  <p:cSld name="Title Slide">
-    <p:spTree>
-      <p:nvGrpSpPr>
-        <p:cNvPr id="1" name=""/>
-        <p:cNvGrpSpPr/>
-        <p:nvPr/>
-      </p:nvGrpSpPr>
-      <p:grpSpPr>
-        <a:xfrm>
-          <a:off x="0" y="0"/>
-          <a:ext cx="0" cy="0"/>
-          <a:chOff x="0" y="0"/>
-          <a:chExt cx="0" cy="0"/>
-        </a:xfrm>
-      </p:grpSpPr>
-      <p:sp>
-        <p:nvSpPr>
-          <p:cNvPr id="114" name="PlaceHolder 1"/>
-          <p:cNvSpPr>
-            <a:spLocks noGrp="1"/>
-          </p:cNvSpPr>
-          <p:nvPr>
-            <p:ph type="title"/>
-          </p:nvPr>
-        </p:nvSpPr>
-        <p:spPr>
-          <a:xfrm>
-            <a:off x="609480" y="273600"/>
-            <a:ext cx="10972440" cy="1145160"/>
-          </a:xfrm>
-          <a:prstGeom prst="rect">
-            <a:avLst/>
-          </a:prstGeom>
-        </p:spPr>
-        <p:txBody>
-          <a:bodyPr lIns="0" rIns="0" tIns="0" bIns="0" anchor="ctr"/>
-          <a:p>
-            <a:endParaRPr/>
-          </a:p>
-        </p:txBody>
-      </p:sp>
-      <p:sp>
-        <p:nvSpPr>
-          <p:cNvPr id="115" name="PlaceHolder 2"/>
-          <p:cNvSpPr>
-            <a:spLocks noGrp="1"/>
-          </p:cNvSpPr>
-          <p:nvPr>
-            <p:ph type="subTitle"/>
-          </p:nvPr>
-        </p:nvSpPr>
-        <p:spPr>
-          <a:xfrm>
-            <a:off x="609480" y="1604520"/>
-            <a:ext cx="10972440" cy="3977640"/>
-          </a:xfrm>
-          <a:prstGeom prst="rect">
-            <a:avLst/>
-          </a:prstGeom>
-        </p:spPr>
-        <p:txBody>
-          <a:bodyPr lIns="0" rIns="0" tIns="0" bIns="0" anchor="ctr"/>
-          <a:p>
-            <a:pPr algn="ctr"/>
-            <a:endParaRPr/>
-          </a:p>
-        </p:txBody>
-      </p:sp>
-    </p:spTree>
-  </p:cSld>
-</p:sldLayout>
-</file>
-
-<file path=ppt/slideLayouts/slideLayout39.xml><?xml version="1.0" encoding="utf-8"?>
-<p:sldLayout xmlns:a="http://schemas.openxmlformats.org/drawingml/2006/main" xmlns:p="http://schemas.openxmlformats.org/presentationml/2006/main" xmlns:r="http://schemas.openxmlformats.org/officeDocument/2006/relationships" type="obj" preserve="1">
-  <p:cSld name="Title, Content">
-    <p:spTree>
-      <p:nvGrpSpPr>
-        <p:cNvPr id="1" name=""/>
-        <p:cNvGrpSpPr/>
-        <p:nvPr/>
-      </p:nvGrpSpPr>
-      <p:grpSpPr>
-        <a:xfrm>
-          <a:off x="0" y="0"/>
-          <a:ext cx="0" cy="0"/>
-          <a:chOff x="0" y="0"/>
-          <a:chExt cx="0" cy="0"/>
-        </a:xfrm>
-      </p:grpSpPr>
-      <p:sp>
-        <p:nvSpPr>
-          <p:cNvPr id="116" name="PlaceHolder 1"/>
-          <p:cNvSpPr>
-            <a:spLocks noGrp="1"/>
-          </p:cNvSpPr>
-          <p:nvPr>
-            <p:ph type="title"/>
-          </p:nvPr>
-        </p:nvSpPr>
-        <p:spPr>
-          <a:xfrm>
-            <a:off x="609480" y="273600"/>
-            <a:ext cx="10972440" cy="1145160"/>
-          </a:xfrm>
-          <a:prstGeom prst="rect">
-            <a:avLst/>
-          </a:prstGeom>
-        </p:spPr>
-        <p:txBody>
-          <a:bodyPr lIns="0" rIns="0" tIns="0" bIns="0" anchor="ctr"/>
-          <a:p>
-            <a:endParaRPr/>
-          </a:p>
-        </p:txBody>
-      </p:sp>
-      <p:sp>
-        <p:nvSpPr>
-          <p:cNvPr id="117" name="PlaceHolder 2"/>
-          <p:cNvSpPr>
-            <a:spLocks noGrp="1"/>
-          </p:cNvSpPr>
-          <p:nvPr>
-            <p:ph type="body"/>
-          </p:nvPr>
-        </p:nvSpPr>
-        <p:spPr>
-          <a:xfrm>
-            <a:off x="609480" y="1604520"/>
-            <a:ext cx="10972440" cy="3977280"/>
-          </a:xfrm>
-          <a:prstGeom prst="rect">
-            <a:avLst/>
-          </a:prstGeom>
-        </p:spPr>
-        <p:txBody>
-          <a:bodyPr lIns="0" rIns="0" tIns="0" bIns="0"/>
-          <a:p>
-            <a:endParaRPr/>
-          </a:p>
-        </p:txBody>
-      </p:sp>
     </p:spTree>
   </p:cSld>
 </p:sldLayout>
@@ -3498,6 +3352,7 @@
         <p:txBody>
           <a:bodyPr lIns="0" rIns="0" tIns="0" bIns="0" anchor="ctr"/>
           <a:p>
+            <a:pPr algn="ctr"/>
             <a:endParaRPr/>
           </a:p>
         </p:txBody>
@@ -3554,983 +3409,6 @@
           </a:p>
         </p:txBody>
       </p:sp>
-    </p:spTree>
-  </p:cSld>
-</p:sldLayout>
-</file>
-
-<file path=ppt/slideLayouts/slideLayout40.xml><?xml version="1.0" encoding="utf-8"?>
-<p:sldLayout xmlns:a="http://schemas.openxmlformats.org/drawingml/2006/main" xmlns:p="http://schemas.openxmlformats.org/presentationml/2006/main" xmlns:r="http://schemas.openxmlformats.org/officeDocument/2006/relationships" type="twoObj" preserve="1">
-  <p:cSld name="Title, 2 Content">
-    <p:spTree>
-      <p:nvGrpSpPr>
-        <p:cNvPr id="1" name=""/>
-        <p:cNvGrpSpPr/>
-        <p:nvPr/>
-      </p:nvGrpSpPr>
-      <p:grpSpPr>
-        <a:xfrm>
-          <a:off x="0" y="0"/>
-          <a:ext cx="0" cy="0"/>
-          <a:chOff x="0" y="0"/>
-          <a:chExt cx="0" cy="0"/>
-        </a:xfrm>
-      </p:grpSpPr>
-      <p:sp>
-        <p:nvSpPr>
-          <p:cNvPr id="118" name="PlaceHolder 1"/>
-          <p:cNvSpPr>
-            <a:spLocks noGrp="1"/>
-          </p:cNvSpPr>
-          <p:nvPr>
-            <p:ph type="title"/>
-          </p:nvPr>
-        </p:nvSpPr>
-        <p:spPr>
-          <a:xfrm>
-            <a:off x="609480" y="273600"/>
-            <a:ext cx="10972440" cy="1145160"/>
-          </a:xfrm>
-          <a:prstGeom prst="rect">
-            <a:avLst/>
-          </a:prstGeom>
-        </p:spPr>
-        <p:txBody>
-          <a:bodyPr lIns="0" rIns="0" tIns="0" bIns="0" anchor="ctr"/>
-          <a:p>
-            <a:endParaRPr/>
-          </a:p>
-        </p:txBody>
-      </p:sp>
-      <p:sp>
-        <p:nvSpPr>
-          <p:cNvPr id="119" name="PlaceHolder 2"/>
-          <p:cNvSpPr>
-            <a:spLocks noGrp="1"/>
-          </p:cNvSpPr>
-          <p:nvPr>
-            <p:ph type="body"/>
-          </p:nvPr>
-        </p:nvSpPr>
-        <p:spPr>
-          <a:xfrm>
-            <a:off x="609480" y="1604520"/>
-            <a:ext cx="5354280" cy="3977280"/>
-          </a:xfrm>
-          <a:prstGeom prst="rect">
-            <a:avLst/>
-          </a:prstGeom>
-        </p:spPr>
-        <p:txBody>
-          <a:bodyPr lIns="0" rIns="0" tIns="0" bIns="0"/>
-          <a:p>
-            <a:endParaRPr/>
-          </a:p>
-        </p:txBody>
-      </p:sp>
-      <p:sp>
-        <p:nvSpPr>
-          <p:cNvPr id="120" name="PlaceHolder 3"/>
-          <p:cNvSpPr>
-            <a:spLocks noGrp="1"/>
-          </p:cNvSpPr>
-          <p:nvPr>
-            <p:ph type="body"/>
-          </p:nvPr>
-        </p:nvSpPr>
-        <p:spPr>
-          <a:xfrm>
-            <a:off x="6231960" y="1604520"/>
-            <a:ext cx="5354280" cy="3977280"/>
-          </a:xfrm>
-          <a:prstGeom prst="rect">
-            <a:avLst/>
-          </a:prstGeom>
-        </p:spPr>
-        <p:txBody>
-          <a:bodyPr lIns="0" rIns="0" tIns="0" bIns="0"/>
-          <a:p>
-            <a:endParaRPr/>
-          </a:p>
-        </p:txBody>
-      </p:sp>
-    </p:spTree>
-  </p:cSld>
-</p:sldLayout>
-</file>
-
-<file path=ppt/slideLayouts/slideLayout41.xml><?xml version="1.0" encoding="utf-8"?>
-<p:sldLayout xmlns:a="http://schemas.openxmlformats.org/drawingml/2006/main" xmlns:p="http://schemas.openxmlformats.org/presentationml/2006/main" xmlns:r="http://schemas.openxmlformats.org/officeDocument/2006/relationships" type="titleOnly" preserve="1">
-  <p:cSld name="Title Only">
-    <p:spTree>
-      <p:nvGrpSpPr>
-        <p:cNvPr id="1" name=""/>
-        <p:cNvGrpSpPr/>
-        <p:nvPr/>
-      </p:nvGrpSpPr>
-      <p:grpSpPr>
-        <a:xfrm>
-          <a:off x="0" y="0"/>
-          <a:ext cx="0" cy="0"/>
-          <a:chOff x="0" y="0"/>
-          <a:chExt cx="0" cy="0"/>
-        </a:xfrm>
-      </p:grpSpPr>
-      <p:sp>
-        <p:nvSpPr>
-          <p:cNvPr id="121" name="PlaceHolder 1"/>
-          <p:cNvSpPr>
-            <a:spLocks noGrp="1"/>
-          </p:cNvSpPr>
-          <p:nvPr>
-            <p:ph type="title"/>
-          </p:nvPr>
-        </p:nvSpPr>
-        <p:spPr>
-          <a:xfrm>
-            <a:off x="609480" y="273600"/>
-            <a:ext cx="10972440" cy="1145160"/>
-          </a:xfrm>
-          <a:prstGeom prst="rect">
-            <a:avLst/>
-          </a:prstGeom>
-        </p:spPr>
-        <p:txBody>
-          <a:bodyPr lIns="0" rIns="0" tIns="0" bIns="0" anchor="ctr"/>
-          <a:p>
-            <a:endParaRPr/>
-          </a:p>
-        </p:txBody>
-      </p:sp>
-    </p:spTree>
-  </p:cSld>
-</p:sldLayout>
-</file>
-
-<file path=ppt/slideLayouts/slideLayout42.xml><?xml version="1.0" encoding="utf-8"?>
-<p:sldLayout xmlns:a="http://schemas.openxmlformats.org/drawingml/2006/main" xmlns:p="http://schemas.openxmlformats.org/presentationml/2006/main" xmlns:r="http://schemas.openxmlformats.org/officeDocument/2006/relationships" type="objOnly" preserve="1">
-  <p:cSld name="Centered Text">
-    <p:spTree>
-      <p:nvGrpSpPr>
-        <p:cNvPr id="1" name=""/>
-        <p:cNvGrpSpPr/>
-        <p:nvPr/>
-      </p:nvGrpSpPr>
-      <p:grpSpPr>
-        <a:xfrm>
-          <a:off x="0" y="0"/>
-          <a:ext cx="0" cy="0"/>
-          <a:chOff x="0" y="0"/>
-          <a:chExt cx="0" cy="0"/>
-        </a:xfrm>
-      </p:grpSpPr>
-      <p:sp>
-        <p:nvSpPr>
-          <p:cNvPr id="122" name="PlaceHolder 1"/>
-          <p:cNvSpPr>
-            <a:spLocks noGrp="1"/>
-          </p:cNvSpPr>
-          <p:nvPr>
-            <p:ph type="subTitle"/>
-          </p:nvPr>
-        </p:nvSpPr>
-        <p:spPr>
-          <a:xfrm>
-            <a:off x="609480" y="273600"/>
-            <a:ext cx="10972440" cy="5308200"/>
-          </a:xfrm>
-          <a:prstGeom prst="rect">
-            <a:avLst/>
-          </a:prstGeom>
-        </p:spPr>
-        <p:txBody>
-          <a:bodyPr lIns="0" rIns="0" tIns="0" bIns="0" anchor="ctr"/>
-          <a:p>
-            <a:pPr algn="ctr"/>
-            <a:endParaRPr/>
-          </a:p>
-        </p:txBody>
-      </p:sp>
-    </p:spTree>
-  </p:cSld>
-</p:sldLayout>
-</file>
-
-<file path=ppt/slideLayouts/slideLayout43.xml><?xml version="1.0" encoding="utf-8"?>
-<p:sldLayout xmlns:a="http://schemas.openxmlformats.org/drawingml/2006/main" xmlns:p="http://schemas.openxmlformats.org/presentationml/2006/main" xmlns:r="http://schemas.openxmlformats.org/officeDocument/2006/relationships" type="twoObjAndObj" preserve="1">
-  <p:cSld name="Title, 2 Content and Content">
-    <p:spTree>
-      <p:nvGrpSpPr>
-        <p:cNvPr id="1" name=""/>
-        <p:cNvGrpSpPr/>
-        <p:nvPr/>
-      </p:nvGrpSpPr>
-      <p:grpSpPr>
-        <a:xfrm>
-          <a:off x="0" y="0"/>
-          <a:ext cx="0" cy="0"/>
-          <a:chOff x="0" y="0"/>
-          <a:chExt cx="0" cy="0"/>
-        </a:xfrm>
-      </p:grpSpPr>
-      <p:sp>
-        <p:nvSpPr>
-          <p:cNvPr id="123" name="PlaceHolder 1"/>
-          <p:cNvSpPr>
-            <a:spLocks noGrp="1"/>
-          </p:cNvSpPr>
-          <p:nvPr>
-            <p:ph type="title"/>
-          </p:nvPr>
-        </p:nvSpPr>
-        <p:spPr>
-          <a:xfrm>
-            <a:off x="609480" y="273600"/>
-            <a:ext cx="10972440" cy="1145160"/>
-          </a:xfrm>
-          <a:prstGeom prst="rect">
-            <a:avLst/>
-          </a:prstGeom>
-        </p:spPr>
-        <p:txBody>
-          <a:bodyPr lIns="0" rIns="0" tIns="0" bIns="0" anchor="ctr"/>
-          <a:p>
-            <a:endParaRPr/>
-          </a:p>
-        </p:txBody>
-      </p:sp>
-      <p:sp>
-        <p:nvSpPr>
-          <p:cNvPr id="124" name="PlaceHolder 2"/>
-          <p:cNvSpPr>
-            <a:spLocks noGrp="1"/>
-          </p:cNvSpPr>
-          <p:nvPr>
-            <p:ph type="body"/>
-          </p:nvPr>
-        </p:nvSpPr>
-        <p:spPr>
-          <a:xfrm>
-            <a:off x="609480" y="1604520"/>
-            <a:ext cx="5354280" cy="1896840"/>
-          </a:xfrm>
-          <a:prstGeom prst="rect">
-            <a:avLst/>
-          </a:prstGeom>
-        </p:spPr>
-        <p:txBody>
-          <a:bodyPr lIns="0" rIns="0" tIns="0" bIns="0"/>
-          <a:p>
-            <a:endParaRPr/>
-          </a:p>
-        </p:txBody>
-      </p:sp>
-      <p:sp>
-        <p:nvSpPr>
-          <p:cNvPr id="125" name="PlaceHolder 3"/>
-          <p:cNvSpPr>
-            <a:spLocks noGrp="1"/>
-          </p:cNvSpPr>
-          <p:nvPr>
-            <p:ph type="body"/>
-          </p:nvPr>
-        </p:nvSpPr>
-        <p:spPr>
-          <a:xfrm>
-            <a:off x="609480" y="3682080"/>
-            <a:ext cx="5354280" cy="1896840"/>
-          </a:xfrm>
-          <a:prstGeom prst="rect">
-            <a:avLst/>
-          </a:prstGeom>
-        </p:spPr>
-        <p:txBody>
-          <a:bodyPr lIns="0" rIns="0" tIns="0" bIns="0"/>
-          <a:p>
-            <a:endParaRPr/>
-          </a:p>
-        </p:txBody>
-      </p:sp>
-      <p:sp>
-        <p:nvSpPr>
-          <p:cNvPr id="126" name="PlaceHolder 4"/>
-          <p:cNvSpPr>
-            <a:spLocks noGrp="1"/>
-          </p:cNvSpPr>
-          <p:nvPr>
-            <p:ph type="body"/>
-          </p:nvPr>
-        </p:nvSpPr>
-        <p:spPr>
-          <a:xfrm>
-            <a:off x="6231960" y="1604520"/>
-            <a:ext cx="5354280" cy="3977280"/>
-          </a:xfrm>
-          <a:prstGeom prst="rect">
-            <a:avLst/>
-          </a:prstGeom>
-        </p:spPr>
-        <p:txBody>
-          <a:bodyPr lIns="0" rIns="0" tIns="0" bIns="0"/>
-          <a:p>
-            <a:endParaRPr/>
-          </a:p>
-        </p:txBody>
-      </p:sp>
-    </p:spTree>
-  </p:cSld>
-</p:sldLayout>
-</file>
-
-<file path=ppt/slideLayouts/slideLayout44.xml><?xml version="1.0" encoding="utf-8"?>
-<p:sldLayout xmlns:a="http://schemas.openxmlformats.org/drawingml/2006/main" xmlns:p="http://schemas.openxmlformats.org/presentationml/2006/main" xmlns:r="http://schemas.openxmlformats.org/officeDocument/2006/relationships" type="objAndTwoObj" preserve="1">
-  <p:cSld name="Title Content and 2 Content">
-    <p:spTree>
-      <p:nvGrpSpPr>
-        <p:cNvPr id="1" name=""/>
-        <p:cNvGrpSpPr/>
-        <p:nvPr/>
-      </p:nvGrpSpPr>
-      <p:grpSpPr>
-        <a:xfrm>
-          <a:off x="0" y="0"/>
-          <a:ext cx="0" cy="0"/>
-          <a:chOff x="0" y="0"/>
-          <a:chExt cx="0" cy="0"/>
-        </a:xfrm>
-      </p:grpSpPr>
-      <p:sp>
-        <p:nvSpPr>
-          <p:cNvPr id="127" name="PlaceHolder 1"/>
-          <p:cNvSpPr>
-            <a:spLocks noGrp="1"/>
-          </p:cNvSpPr>
-          <p:nvPr>
-            <p:ph type="title"/>
-          </p:nvPr>
-        </p:nvSpPr>
-        <p:spPr>
-          <a:xfrm>
-            <a:off x="609480" y="273600"/>
-            <a:ext cx="10972440" cy="1145160"/>
-          </a:xfrm>
-          <a:prstGeom prst="rect">
-            <a:avLst/>
-          </a:prstGeom>
-        </p:spPr>
-        <p:txBody>
-          <a:bodyPr lIns="0" rIns="0" tIns="0" bIns="0" anchor="ctr"/>
-          <a:p>
-            <a:endParaRPr/>
-          </a:p>
-        </p:txBody>
-      </p:sp>
-      <p:sp>
-        <p:nvSpPr>
-          <p:cNvPr id="128" name="PlaceHolder 2"/>
-          <p:cNvSpPr>
-            <a:spLocks noGrp="1"/>
-          </p:cNvSpPr>
-          <p:nvPr>
-            <p:ph type="body"/>
-          </p:nvPr>
-        </p:nvSpPr>
-        <p:spPr>
-          <a:xfrm>
-            <a:off x="609480" y="1604520"/>
-            <a:ext cx="5354280" cy="3977280"/>
-          </a:xfrm>
-          <a:prstGeom prst="rect">
-            <a:avLst/>
-          </a:prstGeom>
-        </p:spPr>
-        <p:txBody>
-          <a:bodyPr lIns="0" rIns="0" tIns="0" bIns="0"/>
-          <a:p>
-            <a:endParaRPr/>
-          </a:p>
-        </p:txBody>
-      </p:sp>
-      <p:sp>
-        <p:nvSpPr>
-          <p:cNvPr id="129" name="PlaceHolder 3"/>
-          <p:cNvSpPr>
-            <a:spLocks noGrp="1"/>
-          </p:cNvSpPr>
-          <p:nvPr>
-            <p:ph type="body"/>
-          </p:nvPr>
-        </p:nvSpPr>
-        <p:spPr>
-          <a:xfrm>
-            <a:off x="6231960" y="1604520"/>
-            <a:ext cx="5354280" cy="1896840"/>
-          </a:xfrm>
-          <a:prstGeom prst="rect">
-            <a:avLst/>
-          </a:prstGeom>
-        </p:spPr>
-        <p:txBody>
-          <a:bodyPr lIns="0" rIns="0" tIns="0" bIns="0"/>
-          <a:p>
-            <a:endParaRPr/>
-          </a:p>
-        </p:txBody>
-      </p:sp>
-      <p:sp>
-        <p:nvSpPr>
-          <p:cNvPr id="130" name="PlaceHolder 4"/>
-          <p:cNvSpPr>
-            <a:spLocks noGrp="1"/>
-          </p:cNvSpPr>
-          <p:nvPr>
-            <p:ph type="body"/>
-          </p:nvPr>
-        </p:nvSpPr>
-        <p:spPr>
-          <a:xfrm>
-            <a:off x="6231960" y="3682080"/>
-            <a:ext cx="5354280" cy="1896840"/>
-          </a:xfrm>
-          <a:prstGeom prst="rect">
-            <a:avLst/>
-          </a:prstGeom>
-        </p:spPr>
-        <p:txBody>
-          <a:bodyPr lIns="0" rIns="0" tIns="0" bIns="0"/>
-          <a:p>
-            <a:endParaRPr/>
-          </a:p>
-        </p:txBody>
-      </p:sp>
-    </p:spTree>
-  </p:cSld>
-</p:sldLayout>
-</file>
-
-<file path=ppt/slideLayouts/slideLayout45.xml><?xml version="1.0" encoding="utf-8"?>
-<p:sldLayout xmlns:a="http://schemas.openxmlformats.org/drawingml/2006/main" xmlns:p="http://schemas.openxmlformats.org/presentationml/2006/main" xmlns:r="http://schemas.openxmlformats.org/officeDocument/2006/relationships" type="twoObjOverTx" preserve="1">
-  <p:cSld name="Title, 2 Content over Content">
-    <p:spTree>
-      <p:nvGrpSpPr>
-        <p:cNvPr id="1" name=""/>
-        <p:cNvGrpSpPr/>
-        <p:nvPr/>
-      </p:nvGrpSpPr>
-      <p:grpSpPr>
-        <a:xfrm>
-          <a:off x="0" y="0"/>
-          <a:ext cx="0" cy="0"/>
-          <a:chOff x="0" y="0"/>
-          <a:chExt cx="0" cy="0"/>
-        </a:xfrm>
-      </p:grpSpPr>
-      <p:sp>
-        <p:nvSpPr>
-          <p:cNvPr id="131" name="PlaceHolder 1"/>
-          <p:cNvSpPr>
-            <a:spLocks noGrp="1"/>
-          </p:cNvSpPr>
-          <p:nvPr>
-            <p:ph type="title"/>
-          </p:nvPr>
-        </p:nvSpPr>
-        <p:spPr>
-          <a:xfrm>
-            <a:off x="609480" y="273600"/>
-            <a:ext cx="10972440" cy="1145160"/>
-          </a:xfrm>
-          <a:prstGeom prst="rect">
-            <a:avLst/>
-          </a:prstGeom>
-        </p:spPr>
-        <p:txBody>
-          <a:bodyPr lIns="0" rIns="0" tIns="0" bIns="0" anchor="ctr"/>
-          <a:p>
-            <a:endParaRPr/>
-          </a:p>
-        </p:txBody>
-      </p:sp>
-      <p:sp>
-        <p:nvSpPr>
-          <p:cNvPr id="132" name="PlaceHolder 2"/>
-          <p:cNvSpPr>
-            <a:spLocks noGrp="1"/>
-          </p:cNvSpPr>
-          <p:nvPr>
-            <p:ph type="body"/>
-          </p:nvPr>
-        </p:nvSpPr>
-        <p:spPr>
-          <a:xfrm>
-            <a:off x="609480" y="1604520"/>
-            <a:ext cx="5354280" cy="1896840"/>
-          </a:xfrm>
-          <a:prstGeom prst="rect">
-            <a:avLst/>
-          </a:prstGeom>
-        </p:spPr>
-        <p:txBody>
-          <a:bodyPr lIns="0" rIns="0" tIns="0" bIns="0"/>
-          <a:p>
-            <a:endParaRPr/>
-          </a:p>
-        </p:txBody>
-      </p:sp>
-      <p:sp>
-        <p:nvSpPr>
-          <p:cNvPr id="133" name="PlaceHolder 3"/>
-          <p:cNvSpPr>
-            <a:spLocks noGrp="1"/>
-          </p:cNvSpPr>
-          <p:nvPr>
-            <p:ph type="body"/>
-          </p:nvPr>
-        </p:nvSpPr>
-        <p:spPr>
-          <a:xfrm>
-            <a:off x="6231960" y="1604520"/>
-            <a:ext cx="5354280" cy="1896840"/>
-          </a:xfrm>
-          <a:prstGeom prst="rect">
-            <a:avLst/>
-          </a:prstGeom>
-        </p:spPr>
-        <p:txBody>
-          <a:bodyPr lIns="0" rIns="0" tIns="0" bIns="0"/>
-          <a:p>
-            <a:endParaRPr/>
-          </a:p>
-        </p:txBody>
-      </p:sp>
-      <p:sp>
-        <p:nvSpPr>
-          <p:cNvPr id="134" name="PlaceHolder 4"/>
-          <p:cNvSpPr>
-            <a:spLocks noGrp="1"/>
-          </p:cNvSpPr>
-          <p:nvPr>
-            <p:ph type="body"/>
-          </p:nvPr>
-        </p:nvSpPr>
-        <p:spPr>
-          <a:xfrm>
-            <a:off x="609480" y="3682080"/>
-            <a:ext cx="10972440" cy="1896840"/>
-          </a:xfrm>
-          <a:prstGeom prst="rect">
-            <a:avLst/>
-          </a:prstGeom>
-        </p:spPr>
-        <p:txBody>
-          <a:bodyPr lIns="0" rIns="0" tIns="0" bIns="0"/>
-          <a:p>
-            <a:endParaRPr/>
-          </a:p>
-        </p:txBody>
-      </p:sp>
-    </p:spTree>
-  </p:cSld>
-</p:sldLayout>
-</file>
-
-<file path=ppt/slideLayouts/slideLayout46.xml><?xml version="1.0" encoding="utf-8"?>
-<p:sldLayout xmlns:a="http://schemas.openxmlformats.org/drawingml/2006/main" xmlns:p="http://schemas.openxmlformats.org/presentationml/2006/main" xmlns:r="http://schemas.openxmlformats.org/officeDocument/2006/relationships" type="objOverTx" preserve="1">
-  <p:cSld name="Title, Content over Content">
-    <p:spTree>
-      <p:nvGrpSpPr>
-        <p:cNvPr id="1" name=""/>
-        <p:cNvGrpSpPr/>
-        <p:nvPr/>
-      </p:nvGrpSpPr>
-      <p:grpSpPr>
-        <a:xfrm>
-          <a:off x="0" y="0"/>
-          <a:ext cx="0" cy="0"/>
-          <a:chOff x="0" y="0"/>
-          <a:chExt cx="0" cy="0"/>
-        </a:xfrm>
-      </p:grpSpPr>
-      <p:sp>
-        <p:nvSpPr>
-          <p:cNvPr id="135" name="PlaceHolder 1"/>
-          <p:cNvSpPr>
-            <a:spLocks noGrp="1"/>
-          </p:cNvSpPr>
-          <p:nvPr>
-            <p:ph type="title"/>
-          </p:nvPr>
-        </p:nvSpPr>
-        <p:spPr>
-          <a:xfrm>
-            <a:off x="609480" y="273600"/>
-            <a:ext cx="10972440" cy="1145160"/>
-          </a:xfrm>
-          <a:prstGeom prst="rect">
-            <a:avLst/>
-          </a:prstGeom>
-        </p:spPr>
-        <p:txBody>
-          <a:bodyPr lIns="0" rIns="0" tIns="0" bIns="0" anchor="ctr"/>
-          <a:p>
-            <a:endParaRPr/>
-          </a:p>
-        </p:txBody>
-      </p:sp>
-      <p:sp>
-        <p:nvSpPr>
-          <p:cNvPr id="136" name="PlaceHolder 2"/>
-          <p:cNvSpPr>
-            <a:spLocks noGrp="1"/>
-          </p:cNvSpPr>
-          <p:nvPr>
-            <p:ph type="body"/>
-          </p:nvPr>
-        </p:nvSpPr>
-        <p:spPr>
-          <a:xfrm>
-            <a:off x="609480" y="1604520"/>
-            <a:ext cx="10972440" cy="1896840"/>
-          </a:xfrm>
-          <a:prstGeom prst="rect">
-            <a:avLst/>
-          </a:prstGeom>
-        </p:spPr>
-        <p:txBody>
-          <a:bodyPr lIns="0" rIns="0" tIns="0" bIns="0"/>
-          <a:p>
-            <a:endParaRPr/>
-          </a:p>
-        </p:txBody>
-      </p:sp>
-      <p:sp>
-        <p:nvSpPr>
-          <p:cNvPr id="137" name="PlaceHolder 3"/>
-          <p:cNvSpPr>
-            <a:spLocks noGrp="1"/>
-          </p:cNvSpPr>
-          <p:nvPr>
-            <p:ph type="body"/>
-          </p:nvPr>
-        </p:nvSpPr>
-        <p:spPr>
-          <a:xfrm>
-            <a:off x="609480" y="3682080"/>
-            <a:ext cx="10972440" cy="1896840"/>
-          </a:xfrm>
-          <a:prstGeom prst="rect">
-            <a:avLst/>
-          </a:prstGeom>
-        </p:spPr>
-        <p:txBody>
-          <a:bodyPr lIns="0" rIns="0" tIns="0" bIns="0"/>
-          <a:p>
-            <a:endParaRPr/>
-          </a:p>
-        </p:txBody>
-      </p:sp>
-    </p:spTree>
-  </p:cSld>
-</p:sldLayout>
-</file>
-
-<file path=ppt/slideLayouts/slideLayout47.xml><?xml version="1.0" encoding="utf-8"?>
-<p:sldLayout xmlns:a="http://schemas.openxmlformats.org/drawingml/2006/main" xmlns:p="http://schemas.openxmlformats.org/presentationml/2006/main" xmlns:r="http://schemas.openxmlformats.org/officeDocument/2006/relationships" type="fourObj" preserve="1">
-  <p:cSld name="Title, 4 Content">
-    <p:spTree>
-      <p:nvGrpSpPr>
-        <p:cNvPr id="1" name=""/>
-        <p:cNvGrpSpPr/>
-        <p:nvPr/>
-      </p:nvGrpSpPr>
-      <p:grpSpPr>
-        <a:xfrm>
-          <a:off x="0" y="0"/>
-          <a:ext cx="0" cy="0"/>
-          <a:chOff x="0" y="0"/>
-          <a:chExt cx="0" cy="0"/>
-        </a:xfrm>
-      </p:grpSpPr>
-      <p:sp>
-        <p:nvSpPr>
-          <p:cNvPr id="138" name="PlaceHolder 1"/>
-          <p:cNvSpPr>
-            <a:spLocks noGrp="1"/>
-          </p:cNvSpPr>
-          <p:nvPr>
-            <p:ph type="title"/>
-          </p:nvPr>
-        </p:nvSpPr>
-        <p:spPr>
-          <a:xfrm>
-            <a:off x="609480" y="273600"/>
-            <a:ext cx="10972440" cy="1145160"/>
-          </a:xfrm>
-          <a:prstGeom prst="rect">
-            <a:avLst/>
-          </a:prstGeom>
-        </p:spPr>
-        <p:txBody>
-          <a:bodyPr lIns="0" rIns="0" tIns="0" bIns="0" anchor="ctr"/>
-          <a:p>
-            <a:endParaRPr/>
-          </a:p>
-        </p:txBody>
-      </p:sp>
-      <p:sp>
-        <p:nvSpPr>
-          <p:cNvPr id="139" name="PlaceHolder 2"/>
-          <p:cNvSpPr>
-            <a:spLocks noGrp="1"/>
-          </p:cNvSpPr>
-          <p:nvPr>
-            <p:ph type="body"/>
-          </p:nvPr>
-        </p:nvSpPr>
-        <p:spPr>
-          <a:xfrm>
-            <a:off x="609480" y="1604520"/>
-            <a:ext cx="5354280" cy="1896840"/>
-          </a:xfrm>
-          <a:prstGeom prst="rect">
-            <a:avLst/>
-          </a:prstGeom>
-        </p:spPr>
-        <p:txBody>
-          <a:bodyPr lIns="0" rIns="0" tIns="0" bIns="0"/>
-          <a:p>
-            <a:endParaRPr/>
-          </a:p>
-        </p:txBody>
-      </p:sp>
-      <p:sp>
-        <p:nvSpPr>
-          <p:cNvPr id="140" name="PlaceHolder 3"/>
-          <p:cNvSpPr>
-            <a:spLocks noGrp="1"/>
-          </p:cNvSpPr>
-          <p:nvPr>
-            <p:ph type="body"/>
-          </p:nvPr>
-        </p:nvSpPr>
-        <p:spPr>
-          <a:xfrm>
-            <a:off x="6231960" y="1604520"/>
-            <a:ext cx="5354280" cy="1896840"/>
-          </a:xfrm>
-          <a:prstGeom prst="rect">
-            <a:avLst/>
-          </a:prstGeom>
-        </p:spPr>
-        <p:txBody>
-          <a:bodyPr lIns="0" rIns="0" tIns="0" bIns="0"/>
-          <a:p>
-            <a:endParaRPr/>
-          </a:p>
-        </p:txBody>
-      </p:sp>
-      <p:sp>
-        <p:nvSpPr>
-          <p:cNvPr id="141" name="PlaceHolder 4"/>
-          <p:cNvSpPr>
-            <a:spLocks noGrp="1"/>
-          </p:cNvSpPr>
-          <p:nvPr>
-            <p:ph type="body"/>
-          </p:nvPr>
-        </p:nvSpPr>
-        <p:spPr>
-          <a:xfrm>
-            <a:off x="6231960" y="3682080"/>
-            <a:ext cx="5354280" cy="1896840"/>
-          </a:xfrm>
-          <a:prstGeom prst="rect">
-            <a:avLst/>
-          </a:prstGeom>
-        </p:spPr>
-        <p:txBody>
-          <a:bodyPr lIns="0" rIns="0" tIns="0" bIns="0"/>
-          <a:p>
-            <a:endParaRPr/>
-          </a:p>
-        </p:txBody>
-      </p:sp>
-      <p:sp>
-        <p:nvSpPr>
-          <p:cNvPr id="142" name="PlaceHolder 5"/>
-          <p:cNvSpPr>
-            <a:spLocks noGrp="1"/>
-          </p:cNvSpPr>
-          <p:nvPr>
-            <p:ph type="body"/>
-          </p:nvPr>
-        </p:nvSpPr>
-        <p:spPr>
-          <a:xfrm>
-            <a:off x="609480" y="3682080"/>
-            <a:ext cx="5354280" cy="1896840"/>
-          </a:xfrm>
-          <a:prstGeom prst="rect">
-            <a:avLst/>
-          </a:prstGeom>
-        </p:spPr>
-        <p:txBody>
-          <a:bodyPr lIns="0" rIns="0" tIns="0" bIns="0"/>
-          <a:p>
-            <a:endParaRPr/>
-          </a:p>
-        </p:txBody>
-      </p:sp>
-    </p:spTree>
-  </p:cSld>
-</p:sldLayout>
-</file>
-
-<file path=ppt/slideLayouts/slideLayout48.xml><?xml version="1.0" encoding="utf-8"?>
-<p:sldLayout xmlns:a="http://schemas.openxmlformats.org/drawingml/2006/main" xmlns:p="http://schemas.openxmlformats.org/presentationml/2006/main" xmlns:r="http://schemas.openxmlformats.org/officeDocument/2006/relationships" type="blank" preserve="1">
-  <p:cSld name="Title, 6 Content">
-    <p:spTree>
-      <p:nvGrpSpPr>
-        <p:cNvPr id="1" name=""/>
-        <p:cNvGrpSpPr/>
-        <p:nvPr/>
-      </p:nvGrpSpPr>
-      <p:grpSpPr>
-        <a:xfrm>
-          <a:off x="0" y="0"/>
-          <a:ext cx="0" cy="0"/>
-          <a:chOff x="0" y="0"/>
-          <a:chExt cx="0" cy="0"/>
-        </a:xfrm>
-      </p:grpSpPr>
-      <p:sp>
-        <p:nvSpPr>
-          <p:cNvPr id="143" name="PlaceHolder 1"/>
-          <p:cNvSpPr>
-            <a:spLocks noGrp="1"/>
-          </p:cNvSpPr>
-          <p:nvPr>
-            <p:ph type="title"/>
-          </p:nvPr>
-        </p:nvSpPr>
-        <p:spPr>
-          <a:xfrm>
-            <a:off x="609480" y="273600"/>
-            <a:ext cx="10972440" cy="1145160"/>
-          </a:xfrm>
-          <a:prstGeom prst="rect">
-            <a:avLst/>
-          </a:prstGeom>
-        </p:spPr>
-        <p:txBody>
-          <a:bodyPr lIns="0" rIns="0" tIns="0" bIns="0" anchor="ctr"/>
-          <a:p>
-            <a:endParaRPr/>
-          </a:p>
-        </p:txBody>
-      </p:sp>
-      <p:sp>
-        <p:nvSpPr>
-          <p:cNvPr id="144" name="PlaceHolder 2"/>
-          <p:cNvSpPr>
-            <a:spLocks noGrp="1"/>
-          </p:cNvSpPr>
-          <p:nvPr>
-            <p:ph type="body"/>
-          </p:nvPr>
-        </p:nvSpPr>
-        <p:spPr>
-          <a:xfrm>
-            <a:off x="609480" y="1604520"/>
-            <a:ext cx="10972440" cy="3977280"/>
-          </a:xfrm>
-          <a:prstGeom prst="rect">
-            <a:avLst/>
-          </a:prstGeom>
-        </p:spPr>
-        <p:txBody>
-          <a:bodyPr lIns="0" rIns="0" tIns="0" bIns="0"/>
-          <a:p>
-            <a:endParaRPr/>
-          </a:p>
-        </p:txBody>
-      </p:sp>
-      <p:sp>
-        <p:nvSpPr>
-          <p:cNvPr id="145" name="PlaceHolder 3"/>
-          <p:cNvSpPr>
-            <a:spLocks noGrp="1"/>
-          </p:cNvSpPr>
-          <p:nvPr>
-            <p:ph type="body"/>
-          </p:nvPr>
-        </p:nvSpPr>
-        <p:spPr>
-          <a:xfrm>
-            <a:off x="609480" y="1604520"/>
-            <a:ext cx="10972440" cy="3977280"/>
-          </a:xfrm>
-          <a:prstGeom prst="rect">
-            <a:avLst/>
-          </a:prstGeom>
-        </p:spPr>
-        <p:txBody>
-          <a:bodyPr lIns="0" rIns="0" tIns="0" bIns="0"/>
-          <a:p>
-            <a:endParaRPr/>
-          </a:p>
-        </p:txBody>
-      </p:sp>
-      <p:pic>
-        <p:nvPicPr>
-          <p:cNvPr id="146" name="" descr=""/>
-          <p:cNvPicPr/>
-          <p:nvPr/>
-        </p:nvPicPr>
-        <p:blipFill>
-          <a:blip r:embed="rId2"/>
-          <a:stretch>
-            <a:fillRect/>
-          </a:stretch>
-        </p:blipFill>
-        <p:spPr>
-          <a:xfrm>
-            <a:off x="3602880" y="1604520"/>
-            <a:ext cx="4984920" cy="3977280"/>
-          </a:xfrm>
-          <a:prstGeom prst="rect">
-            <a:avLst/>
-          </a:prstGeom>
-          <a:ln>
-            <a:noFill/>
-          </a:ln>
-        </p:spPr>
-      </p:pic>
-      <p:pic>
-        <p:nvPicPr>
-          <p:cNvPr id="147" name="" descr=""/>
-          <p:cNvPicPr/>
-          <p:nvPr/>
-        </p:nvPicPr>
-        <p:blipFill>
-          <a:blip r:embed="rId3"/>
-          <a:stretch>
-            <a:fillRect/>
-          </a:stretch>
-        </p:blipFill>
-        <p:spPr>
-          <a:xfrm>
-            <a:off x="3602880" y="1604520"/>
-            <a:ext cx="4984920" cy="3977280"/>
-          </a:xfrm>
-          <a:prstGeom prst="rect">
-            <a:avLst/>
-          </a:prstGeom>
-          <a:ln>
-            <a:noFill/>
-          </a:ln>
-        </p:spPr>
-      </p:pic>
     </p:spTree>
   </p:cSld>
 </p:sldLayout>
@@ -4575,6 +3453,7 @@
         <p:txBody>
           <a:bodyPr lIns="0" rIns="0" tIns="0" bIns="0" anchor="ctr"/>
           <a:p>
+            <a:pPr algn="ctr"/>
             <a:endParaRPr/>
           </a:p>
         </p:txBody>
@@ -4672,6 +3551,7 @@
         <p:txBody>
           <a:bodyPr lIns="0" rIns="0" tIns="0" bIns="0" anchor="ctr"/>
           <a:p>
+            <a:pPr algn="ctr"/>
             <a:endParaRPr/>
           </a:p>
         </p:txBody>
@@ -4798,6 +3678,7 @@
         <p:txBody>
           <a:bodyPr lIns="0" rIns="0" tIns="0" bIns="0" anchor="ctr"/>
           <a:p>
+            <a:pPr algn="ctr"/>
             <a:endParaRPr/>
           </a:p>
         </p:txBody>
@@ -4924,6 +3805,7 @@
         <p:txBody>
           <a:bodyPr lIns="0" rIns="0" tIns="0" bIns="0" anchor="ctr"/>
           <a:p>
+            <a:pPr algn="ctr"/>
             <a:endParaRPr/>
           </a:p>
         </p:txBody>
@@ -5050,7 +3932,7 @@
         <p:spPr>
           <a:xfrm>
             <a:off x="8672040" y="6148440"/>
-            <a:ext cx="2913840" cy="434160"/>
+            <a:ext cx="2913480" cy="433800"/>
           </a:xfrm>
           <a:prstGeom prst="rect">
             <a:avLst/>
@@ -5082,8 +3964,9 @@
         <p:txBody>
           <a:bodyPr lIns="0" rIns="0" tIns="0" bIns="0" anchor="ctr"/>
           <a:p>
-            <a:r>
-              <a:rPr lang="en-US">
+            <a:pPr algn="ctr"/>
+            <a:r>
+              <a:rPr lang="en-US" sz="4400">
                 <a:latin typeface="Arial"/>
               </a:rPr>
               <a:t>Click to edit the title text format</a:t>
@@ -5120,7 +4003,7 @@
               <a:buChar char=""/>
             </a:pPr>
             <a:r>
-              <a:rPr lang="en-US">
+              <a:rPr lang="en-US" sz="3200">
                 <a:latin typeface="Arial"/>
               </a:rPr>
               <a:t>Click to edit the outline text format</a:t>
@@ -5134,7 +4017,7 @@
               <a:buChar char=""/>
             </a:pPr>
             <a:r>
-              <a:rPr lang="en-US">
+              <a:rPr lang="en-US" sz="2800">
                 <a:latin typeface="Arial"/>
               </a:rPr>
               <a:t>Second Outline Level</a:t>
@@ -5148,7 +4031,7 @@
               <a:buChar char=""/>
             </a:pPr>
             <a:r>
-              <a:rPr lang="en-US">
+              <a:rPr lang="en-US" sz="2400">
                 <a:latin typeface="Arial"/>
               </a:rPr>
               <a:t>Third Outline Level</a:t>
@@ -5162,7 +4045,7 @@
               <a:buChar char=""/>
             </a:pPr>
             <a:r>
-              <a:rPr lang="en-US">
+              <a:rPr lang="en-US" sz="2000">
                 <a:latin typeface="Arial"/>
               </a:rPr>
               <a:t>Fourth Outline Level</a:t>
@@ -5272,7 +4155,7 @@
         <p:spPr>
           <a:xfrm>
             <a:off x="8672040" y="6148440"/>
-            <a:ext cx="2913840" cy="434160"/>
+            <a:ext cx="2913480" cy="433800"/>
           </a:xfrm>
           <a:prstGeom prst="rect">
             <a:avLst/>
@@ -5295,7 +4178,7 @@
         <p:spPr>
           <a:xfrm>
             <a:off x="609480" y="273600"/>
-            <a:ext cx="10972080" cy="1144800"/>
+            <a:ext cx="10972440" cy="1144800"/>
           </a:xfrm>
           <a:prstGeom prst="rect">
             <a:avLst/>
@@ -5304,8 +4187,9 @@
         <p:txBody>
           <a:bodyPr lIns="0" rIns="0" tIns="0" bIns="0" anchor="ctr"/>
           <a:p>
-            <a:r>
-              <a:rPr lang="en-US">
+            <a:pPr algn="ctr"/>
+            <a:r>
+              <a:rPr lang="en-US" sz="4400">
                 <a:latin typeface="Arial"/>
               </a:rPr>
               <a:t>Click to edit the title text format</a:t>
@@ -5342,7 +4226,7 @@
               <a:buChar char=""/>
             </a:pPr>
             <a:r>
-              <a:rPr lang="en-US">
+              <a:rPr lang="en-US" sz="3200">
                 <a:latin typeface="Arial"/>
               </a:rPr>
               <a:t>Click to edit the outline text format</a:t>
@@ -5356,7 +4240,7 @@
               <a:buChar char=""/>
             </a:pPr>
             <a:r>
-              <a:rPr lang="en-US">
+              <a:rPr lang="en-US" sz="2800">
                 <a:latin typeface="Arial"/>
               </a:rPr>
               <a:t>Second Outline Level</a:t>
@@ -5370,7 +4254,7 @@
               <a:buChar char=""/>
             </a:pPr>
             <a:r>
-              <a:rPr lang="en-US">
+              <a:rPr lang="en-US" sz="2400">
                 <a:latin typeface="Arial"/>
               </a:rPr>
               <a:t>Third Outline Level</a:t>
@@ -5384,7 +4268,7 @@
               <a:buChar char=""/>
             </a:pPr>
             <a:r>
-              <a:rPr lang="en-US">
+              <a:rPr lang="en-US" sz="2000">
                 <a:latin typeface="Arial"/>
               </a:rPr>
               <a:t>Fourth Outline Level</a:t>
@@ -5494,7 +4378,7 @@
         <p:spPr>
           <a:xfrm>
             <a:off x="8672040" y="6148440"/>
-            <a:ext cx="2913840" cy="434160"/>
+            <a:ext cx="2913480" cy="433800"/>
           </a:xfrm>
           <a:prstGeom prst="rect">
             <a:avLst/>
@@ -5526,8 +4410,9 @@
         <p:txBody>
           <a:bodyPr lIns="0" rIns="0" tIns="0" bIns="0" anchor="ctr"/>
           <a:p>
-            <a:r>
-              <a:rPr lang="en-US">
+            <a:pPr algn="ctr"/>
+            <a:r>
+              <a:rPr lang="en-US" sz="4400">
                 <a:latin typeface="Arial"/>
               </a:rPr>
               <a:t>Click to edit the title text format</a:t>
@@ -5564,7 +4449,7 @@
               <a:buChar char=""/>
             </a:pPr>
             <a:r>
-              <a:rPr lang="en-US">
+              <a:rPr lang="en-US" sz="3200">
                 <a:latin typeface="Arial"/>
               </a:rPr>
               <a:t>Click to edit the outline text format</a:t>
@@ -5578,7 +4463,7 @@
               <a:buChar char=""/>
             </a:pPr>
             <a:r>
-              <a:rPr lang="en-US">
+              <a:rPr lang="en-US" sz="2800">
                 <a:latin typeface="Arial"/>
               </a:rPr>
               <a:t>Second Outline Level</a:t>
@@ -5592,7 +4477,7 @@
               <a:buChar char=""/>
             </a:pPr>
             <a:r>
-              <a:rPr lang="en-US">
+              <a:rPr lang="en-US" sz="2400">
                 <a:latin typeface="Arial"/>
               </a:rPr>
               <a:t>Third Outline Level</a:t>
@@ -5606,7 +4491,7 @@
               <a:buChar char=""/>
             </a:pPr>
             <a:r>
-              <a:rPr lang="en-US">
+              <a:rPr lang="en-US" sz="2000">
                 <a:latin typeface="Arial"/>
               </a:rPr>
               <a:t>Fourth Outline Level</a:t>
@@ -5673,228 +4558,6 @@
     <p:sldLayoutId id="2147483684" r:id="rId12"/>
     <p:sldLayoutId id="2147483685" r:id="rId13"/>
     <p:sldLayoutId id="2147483686" r:id="rId14"/>
-  </p:sldLayoutIdLst>
-</p:sldMaster>
-</file>
-
-<file path=ppt/slideMasters/slideMaster4.xml><?xml version="1.0" encoding="utf-8"?>
-<p:sldMaster xmlns:a="http://schemas.openxmlformats.org/drawingml/2006/main" xmlns:p="http://schemas.openxmlformats.org/presentationml/2006/main" xmlns:r="http://schemas.openxmlformats.org/officeDocument/2006/relationships">
-  <p:cSld>
-    <p:bg>
-      <p:bgPr>
-        <a:solidFill>
-          <a:srgbClr val="ffffff"/>
-        </a:solidFill>
-      </p:bgPr>
-    </p:bg>
-    <p:spTree>
-      <p:nvGrpSpPr>
-        <p:cNvPr id="1" name=""/>
-        <p:cNvGrpSpPr/>
-        <p:nvPr/>
-      </p:nvGrpSpPr>
-      <p:grpSpPr>
-        <a:xfrm>
-          <a:off x="0" y="0"/>
-          <a:ext cx="0" cy="0"/>
-          <a:chOff x="0" y="0"/>
-          <a:chExt cx="0" cy="0"/>
-        </a:xfrm>
-      </p:grpSpPr>
-      <p:pic>
-        <p:nvPicPr>
-          <p:cNvPr id="111" name="Picture 3" descr=""/>
-          <p:cNvPicPr/>
-          <p:nvPr/>
-        </p:nvPicPr>
-        <p:blipFill>
-          <a:blip r:embed="rId2"/>
-          <a:stretch>
-            <a:fillRect/>
-          </a:stretch>
-        </p:blipFill>
-        <p:spPr>
-          <a:xfrm>
-            <a:off x="8672040" y="6148440"/>
-            <a:ext cx="2913840" cy="434160"/>
-          </a:xfrm>
-          <a:prstGeom prst="rect">
-            <a:avLst/>
-          </a:prstGeom>
-          <a:ln>
-            <a:noFill/>
-          </a:ln>
-        </p:spPr>
-      </p:pic>
-      <p:sp>
-        <p:nvSpPr>
-          <p:cNvPr id="112" name="PlaceHolder 1"/>
-          <p:cNvSpPr>
-            <a:spLocks noGrp="1"/>
-          </p:cNvSpPr>
-          <p:nvPr>
-            <p:ph type="title"/>
-          </p:nvPr>
-        </p:nvSpPr>
-        <p:spPr>
-          <a:xfrm>
-            <a:off x="609480" y="273600"/>
-            <a:ext cx="10972440" cy="1144800"/>
-          </a:xfrm>
-          <a:prstGeom prst="rect">
-            <a:avLst/>
-          </a:prstGeom>
-        </p:spPr>
-        <p:txBody>
-          <a:bodyPr lIns="0" rIns="0" tIns="0" bIns="0" anchor="ctr"/>
-          <a:p>
-            <a:r>
-              <a:rPr lang="en-US">
-                <a:latin typeface="Arial"/>
-              </a:rPr>
-              <a:t>Click to edit the title text format</a:t>
-            </a:r>
-            <a:endParaRPr/>
-          </a:p>
-        </p:txBody>
-      </p:sp>
-      <p:sp>
-        <p:nvSpPr>
-          <p:cNvPr id="113" name="PlaceHolder 2"/>
-          <p:cNvSpPr>
-            <a:spLocks noGrp="1"/>
-          </p:cNvSpPr>
-          <p:nvPr>
-            <p:ph type="body"/>
-          </p:nvPr>
-        </p:nvSpPr>
-        <p:spPr>
-          <a:xfrm>
-            <a:off x="609480" y="1604520"/>
-            <a:ext cx="10972440" cy="3977280"/>
-          </a:xfrm>
-          <a:prstGeom prst="rect">
-            <a:avLst/>
-          </a:prstGeom>
-        </p:spPr>
-        <p:txBody>
-          <a:bodyPr lIns="0" rIns="0" tIns="0" bIns="0"/>
-          <a:p>
-            <a:pPr>
-              <a:buSzPct val="45000"/>
-              <a:buFont typeface="StarSymbol"/>
-              <a:buChar char=""/>
-            </a:pPr>
-            <a:r>
-              <a:rPr lang="en-US">
-                <a:latin typeface="Arial"/>
-              </a:rPr>
-              <a:t>Click to edit the outline text format</a:t>
-            </a:r>
-            <a:endParaRPr/>
-          </a:p>
-          <a:p>
-            <a:pPr lvl="1">
-              <a:buSzPct val="75000"/>
-              <a:buFont typeface="StarSymbol"/>
-              <a:buChar char=""/>
-            </a:pPr>
-            <a:r>
-              <a:rPr lang="en-US">
-                <a:latin typeface="Arial"/>
-              </a:rPr>
-              <a:t>Second Outline Level</a:t>
-            </a:r>
-            <a:endParaRPr/>
-          </a:p>
-          <a:p>
-            <a:pPr lvl="2">
-              <a:buSzPct val="45000"/>
-              <a:buFont typeface="StarSymbol"/>
-              <a:buChar char=""/>
-            </a:pPr>
-            <a:r>
-              <a:rPr lang="en-US">
-                <a:latin typeface="Arial"/>
-              </a:rPr>
-              <a:t>Third Outline Level</a:t>
-            </a:r>
-            <a:endParaRPr/>
-          </a:p>
-          <a:p>
-            <a:pPr lvl="3">
-              <a:buSzPct val="75000"/>
-              <a:buFont typeface="StarSymbol"/>
-              <a:buChar char=""/>
-            </a:pPr>
-            <a:r>
-              <a:rPr lang="en-US">
-                <a:latin typeface="Arial"/>
-              </a:rPr>
-              <a:t>Fourth Outline Level</a:t>
-            </a:r>
-            <a:endParaRPr/>
-          </a:p>
-          <a:p>
-            <a:pPr lvl="4">
-              <a:buSzPct val="45000"/>
-              <a:buFont typeface="StarSymbol"/>
-              <a:buChar char=""/>
-            </a:pPr>
-            <a:r>
-              <a:rPr lang="en-US" sz="2000">
-                <a:latin typeface="Arial"/>
-              </a:rPr>
-              <a:t>Fifth Outline Level</a:t>
-            </a:r>
-            <a:endParaRPr/>
-          </a:p>
-          <a:p>
-            <a:pPr lvl="5">
-              <a:buSzPct val="45000"/>
-              <a:buFont typeface="StarSymbol"/>
-              <a:buChar char=""/>
-            </a:pPr>
-            <a:r>
-              <a:rPr lang="en-US" sz="2000">
-                <a:latin typeface="Arial"/>
-              </a:rPr>
-              <a:t>Sixth Outline Level</a:t>
-            </a:r>
-            <a:endParaRPr/>
-          </a:p>
-          <a:p>
-            <a:pPr lvl="6">
-              <a:buSzPct val="45000"/>
-              <a:buFont typeface="StarSymbol"/>
-              <a:buChar char=""/>
-            </a:pPr>
-            <a:r>
-              <a:rPr lang="en-US" sz="2000">
-                <a:latin typeface="Arial"/>
-              </a:rPr>
-              <a:t>Seventh Outline Level</a:t>
-            </a:r>
-            <a:endParaRPr/>
-          </a:p>
-        </p:txBody>
-      </p:sp>
-    </p:spTree>
-  </p:cSld>
-  <p:clrMap bg1="lt1" bg2="lt2" tx1="dk1" tx2="dk2" accent1="accent1" accent2="accent2" accent3="accent3" accent4="accent4" accent5="accent5" accent6="accent6" hlink="hlink" folHlink="folHlink"/>
-  <p:sldLayoutIdLst>
-    <p:sldLayoutId id="2147483688" r:id="rId3"/>
-    <p:sldLayoutId id="2147483689" r:id="rId4"/>
-    <p:sldLayoutId id="2147483690" r:id="rId5"/>
-    <p:sldLayoutId id="2147483691" r:id="rId6"/>
-    <p:sldLayoutId id="2147483692" r:id="rId7"/>
-    <p:sldLayoutId id="2147483693" r:id="rId8"/>
-    <p:sldLayoutId id="2147483694" r:id="rId9"/>
-    <p:sldLayoutId id="2147483695" r:id="rId10"/>
-    <p:sldLayoutId id="2147483696" r:id="rId11"/>
-    <p:sldLayoutId id="2147483697" r:id="rId12"/>
-    <p:sldLayoutId id="2147483698" r:id="rId13"/>
-    <p:sldLayoutId id="2147483699" r:id="rId14"/>
   </p:sldLayoutIdLst>
 </p:sldMaster>
 </file>
@@ -5925,14 +4588,14 @@
       </p:grpSpPr>
       <p:sp>
         <p:nvSpPr>
-          <p:cNvPr id="153" name="CustomShape 1"/>
+          <p:cNvPr id="116" name="CustomShape 1"/>
           <p:cNvSpPr/>
           <p:nvPr/>
         </p:nvSpPr>
         <p:spPr>
           <a:xfrm>
             <a:off x="1523880" y="1339920"/>
-            <a:ext cx="9133920" cy="1247040"/>
+            <a:ext cx="9133560" cy="1246680"/>
           </a:xfrm>
           <a:prstGeom prst="rect">
             <a:avLst/>
@@ -5966,14 +4629,14 @@
       </p:sp>
       <p:sp>
         <p:nvSpPr>
-          <p:cNvPr id="154" name="CustomShape 2"/>
+          <p:cNvPr id="117" name="CustomShape 2"/>
           <p:cNvSpPr/>
           <p:nvPr/>
         </p:nvSpPr>
         <p:spPr>
           <a:xfrm>
             <a:off x="1523880" y="3127320"/>
-            <a:ext cx="9143280" cy="396000"/>
+            <a:ext cx="9142920" cy="395640"/>
           </a:xfrm>
           <a:prstGeom prst="rect">
             <a:avLst/>
@@ -5986,14 +4649,14 @@
       </p:sp>
       <p:sp>
         <p:nvSpPr>
-          <p:cNvPr id="155" name="CustomShape 3"/>
+          <p:cNvPr id="118" name="CustomShape 3"/>
           <p:cNvSpPr/>
           <p:nvPr/>
         </p:nvSpPr>
         <p:spPr>
           <a:xfrm>
             <a:off x="1523880" y="2541600"/>
-            <a:ext cx="9140040" cy="862200"/>
+            <a:ext cx="9139680" cy="861840"/>
           </a:xfrm>
           <a:prstGeom prst="rect">
             <a:avLst/>
@@ -6035,14 +4698,14 @@
       </p:sp>
       <p:sp>
         <p:nvSpPr>
-          <p:cNvPr id="156" name="CustomShape 4"/>
+          <p:cNvPr id="119" name="CustomShape 4"/>
           <p:cNvSpPr/>
           <p:nvPr/>
         </p:nvSpPr>
         <p:spPr>
           <a:xfrm>
             <a:off x="1523880" y="2928960"/>
-            <a:ext cx="9140040" cy="393120"/>
+            <a:ext cx="9139680" cy="392760"/>
           </a:xfrm>
           <a:prstGeom prst="rect">
             <a:avLst/>
@@ -6055,14 +4718,14 @@
       </p:sp>
       <p:sp>
         <p:nvSpPr>
-          <p:cNvPr id="157" name="CustomShape 5"/>
+          <p:cNvPr id="120" name="CustomShape 5"/>
           <p:cNvSpPr/>
           <p:nvPr/>
         </p:nvSpPr>
         <p:spPr>
           <a:xfrm>
             <a:off x="1525680" y="2857680"/>
-            <a:ext cx="9143280" cy="862200"/>
+            <a:ext cx="9142920" cy="861840"/>
           </a:xfrm>
           <a:prstGeom prst="rect">
             <a:avLst/>
@@ -6104,14 +4767,14 @@
       </p:sp>
       <p:sp>
         <p:nvSpPr>
-          <p:cNvPr id="158" name="CustomShape 6"/>
+          <p:cNvPr id="121" name="CustomShape 6"/>
           <p:cNvSpPr/>
           <p:nvPr/>
         </p:nvSpPr>
         <p:spPr>
           <a:xfrm>
             <a:off x="2878200" y="458640"/>
-            <a:ext cx="6404760" cy="685080"/>
+            <a:ext cx="6404400" cy="684720"/>
           </a:xfrm>
           <a:prstGeom prst="rect">
             <a:avLst/>
@@ -6173,14 +4836,14 @@
       </p:sp>
       <p:sp>
         <p:nvSpPr>
-          <p:cNvPr id="159" name="CustomShape 7"/>
+          <p:cNvPr id="122" name="CustomShape 7"/>
           <p:cNvSpPr/>
           <p:nvPr/>
         </p:nvSpPr>
         <p:spPr>
           <a:xfrm>
             <a:off x="1538280" y="1077840"/>
-            <a:ext cx="9133920" cy="559800"/>
+            <a:ext cx="9133560" cy="559440"/>
           </a:xfrm>
           <a:prstGeom prst="rect">
             <a:avLst/>
@@ -6263,14 +4926,14 @@
       </p:grpSpPr>
       <p:sp>
         <p:nvSpPr>
-          <p:cNvPr id="160" name="CustomShape 1"/>
+          <p:cNvPr id="123" name="CustomShape 1"/>
           <p:cNvSpPr/>
           <p:nvPr/>
         </p:nvSpPr>
         <p:spPr>
           <a:xfrm>
             <a:off x="609480" y="94320"/>
-            <a:ext cx="10972080" cy="1142280"/>
+            <a:ext cx="10971720" cy="1141920"/>
           </a:xfrm>
           <a:prstGeom prst="rect">
             <a:avLst/>
@@ -6296,22 +4959,22 @@
                 <a:latin typeface="Arial"/>
                 <a:ea typeface="MS PGothic"/>
               </a:rPr>
-              <a:t>Demo Unit Updates</a:t>
-            </a:r>
-            <a:endParaRPr/>
-          </a:p>
-        </p:txBody>
-      </p:sp>
-      <p:sp>
-        <p:nvSpPr>
-          <p:cNvPr id="161" name="CustomShape 2"/>
+              <a:t>Custom Board Debug</a:t>
+            </a:r>
+            <a:endParaRPr/>
+          </a:p>
+        </p:txBody>
+      </p:sp>
+      <p:sp>
+        <p:nvSpPr>
+          <p:cNvPr id="124" name="CustomShape 2"/>
           <p:cNvSpPr/>
           <p:nvPr/>
         </p:nvSpPr>
         <p:spPr>
           <a:xfrm>
             <a:off x="609480" y="1504440"/>
-            <a:ext cx="6275880" cy="3443760"/>
+            <a:ext cx="6275520" cy="3443400"/>
           </a:xfrm>
           <a:prstGeom prst="rect">
             <a:avLst/>
@@ -6339,7 +5002,7 @@
                 <a:latin typeface="Arial"/>
                 <a:ea typeface="DejaVu Sans"/>
               </a:rPr>
-              <a:t>A debounce circuit was added to the IMD switch.</a:t>
+              <a:t>A programming board has been ordered from China.</a:t>
             </a:r>
             <a:endParaRPr/>
           </a:p>
@@ -6367,8 +5030,26 @@
                 <a:latin typeface="Arial"/>
                 <a:ea typeface="DejaVu Sans"/>
               </a:rPr>
-              <a:t>The pots sweep in voltage when read by analog pins.  Need a solution for the RMS state </a:t>
-            </a:r>
+              <a:t>Parts to build our own breakout circuit have also been ordered.</a:t>
+            </a:r>
+            <a:endParaRPr/>
+          </a:p>
+          <a:p>
+            <a:pPr>
+              <a:lnSpc>
+                <a:spcPct val="100000"/>
+              </a:lnSpc>
+            </a:pPr>
+            <a:endParaRPr/>
+          </a:p>
+          <a:p>
+            <a:pPr>
+              <a:lnSpc>
+                <a:spcPct val="100000"/>
+              </a:lnSpc>
+              <a:buFont typeface="Arial"/>
+              <a:buChar char="•"/>
+            </a:pPr>
             <a:r>
               <a:rPr lang="en-US" sz="2000">
                 <a:solidFill>
@@ -6377,26 +5058,8 @@
                 <a:latin typeface="Arial"/>
                 <a:ea typeface="DejaVu Sans"/>
               </a:rPr>
-              <a:t>potentiometer</a:t>
-            </a:r>
-            <a:r>
-              <a:rPr lang="en-US" sz="2000">
-                <a:solidFill>
-                  <a:srgbClr val="000000"/>
-                </a:solidFill>
-                <a:latin typeface="Arial"/>
-                <a:ea typeface="DejaVu Sans"/>
-              </a:rPr>
-              <a:t>.</a:t>
-            </a:r>
-            <a:endParaRPr/>
-          </a:p>
-          <a:p>
-            <a:pPr>
-              <a:lnSpc>
-                <a:spcPct val="100000"/>
-              </a:lnSpc>
-            </a:pPr>
+              <a:t>One of these solutions should hopefully fix our issues with the custom board.</a:t>
+            </a:r>
             <a:endParaRPr/>
           </a:p>
           <a:p>
@@ -6407,24 +5070,6 @@
               <a:buFont typeface="Arial"/>
               <a:buChar char="•"/>
             </a:pPr>
-            <a:r>
-              <a:rPr lang="en-US" sz="2000">
-                <a:solidFill>
-                  <a:srgbClr val="000000"/>
-                </a:solidFill>
-                <a:latin typeface="Arial"/>
-                <a:ea typeface="DejaVu Sans"/>
-              </a:rPr>
-              <a:t>Motor temp has been switched out for motor torque.</a:t>
-            </a:r>
-            <a:endParaRPr/>
-          </a:p>
-          <a:p>
-            <a:pPr>
-              <a:lnSpc>
-                <a:spcPct val="100000"/>
-              </a:lnSpc>
-            </a:pPr>
             <a:endParaRPr/>
           </a:p>
           <a:p>
@@ -6435,16 +5080,6 @@
               <a:buFont typeface="Arial"/>
               <a:buChar char="•"/>
             </a:pPr>
-            <a:r>
-              <a:rPr lang="en-US" sz="2000">
-                <a:solidFill>
-                  <a:srgbClr val="000000"/>
-                </a:solidFill>
-                <a:latin typeface="Arial"/>
-                <a:ea typeface="DejaVu Sans"/>
-              </a:rPr>
-              <a:t>Still debugging battery level potentiometer.</a:t>
-            </a:r>
             <a:endParaRPr/>
           </a:p>
           <a:p>
@@ -6459,7 +5094,7 @@
       </p:sp>
       <p:pic>
         <p:nvPicPr>
-          <p:cNvPr id="162" name="Picture 3" descr=""/>
+          <p:cNvPr id="125" name="" descr=""/>
           <p:cNvPicPr/>
           <p:nvPr/>
         </p:nvPicPr>
@@ -6471,8 +5106,8 @@
         </p:blipFill>
         <p:spPr>
           <a:xfrm>
-            <a:off x="6885720" y="3002760"/>
-            <a:ext cx="4842720" cy="2723760"/>
+            <a:off x="6740280" y="2467440"/>
+            <a:ext cx="5238360" cy="3476160"/>
           </a:xfrm>
           <a:prstGeom prst="rect">
             <a:avLst/>
@@ -6533,14 +5168,14 @@
       </p:grpSpPr>
       <p:sp>
         <p:nvSpPr>
-          <p:cNvPr id="163" name="CustomShape 1"/>
+          <p:cNvPr id="126" name="CustomShape 1"/>
           <p:cNvSpPr/>
           <p:nvPr/>
         </p:nvSpPr>
         <p:spPr>
           <a:xfrm>
             <a:off x="609480" y="94320"/>
-            <a:ext cx="10972080" cy="1142280"/>
+            <a:ext cx="10971720" cy="1141920"/>
           </a:xfrm>
           <a:prstGeom prst="rect">
             <a:avLst/>
@@ -6566,22 +5201,22 @@
                 <a:latin typeface="Arial"/>
                 <a:ea typeface="MS PGothic"/>
               </a:rPr>
-              <a:t>Report and Poster</a:t>
-            </a:r>
-            <a:endParaRPr/>
-          </a:p>
-        </p:txBody>
-      </p:sp>
-      <p:sp>
-        <p:nvSpPr>
-          <p:cNvPr id="164" name="CustomShape 2"/>
+              <a:t>Demo Unit Updates</a:t>
+            </a:r>
+            <a:endParaRPr/>
+          </a:p>
+        </p:txBody>
+      </p:sp>
+      <p:sp>
+        <p:nvSpPr>
+          <p:cNvPr id="127" name="CustomShape 2"/>
           <p:cNvSpPr/>
           <p:nvPr/>
         </p:nvSpPr>
         <p:spPr>
           <a:xfrm>
-            <a:off x="609480" y="1236960"/>
-            <a:ext cx="6275880" cy="1005120"/>
+            <a:off x="609480" y="1504440"/>
+            <a:ext cx="6275520" cy="3443400"/>
           </a:xfrm>
           <a:prstGeom prst="rect">
             <a:avLst/>
@@ -6609,7 +5244,7 @@
                 <a:latin typeface="Arial"/>
                 <a:ea typeface="DejaVu Sans"/>
               </a:rPr>
-              <a:t>Need to update this.</a:t>
+              <a:t>A debounce circuit was added to the IMD switch.</a:t>
             </a:r>
             <a:endParaRPr/>
           </a:p>
@@ -6626,6 +5261,82 @@
               <a:lnSpc>
                 <a:spcPct val="100000"/>
               </a:lnSpc>
+              <a:buFont typeface="Arial"/>
+              <a:buChar char="•"/>
+            </a:pPr>
+            <a:r>
+              <a:rPr lang="en-US" sz="2000">
+                <a:solidFill>
+                  <a:srgbClr val="000000"/>
+                </a:solidFill>
+                <a:latin typeface="Arial"/>
+                <a:ea typeface="DejaVu Sans"/>
+              </a:rPr>
+              <a:t>The pots sweep in voltage when read by analog pins.  Need a solution for the RMS state potentiometer.</a:t>
+            </a:r>
+            <a:endParaRPr/>
+          </a:p>
+          <a:p>
+            <a:pPr>
+              <a:lnSpc>
+                <a:spcPct val="100000"/>
+              </a:lnSpc>
+            </a:pPr>
+            <a:endParaRPr/>
+          </a:p>
+          <a:p>
+            <a:pPr>
+              <a:lnSpc>
+                <a:spcPct val="100000"/>
+              </a:lnSpc>
+              <a:buFont typeface="Arial"/>
+              <a:buChar char="•"/>
+            </a:pPr>
+            <a:r>
+              <a:rPr lang="en-US" sz="2000">
+                <a:solidFill>
+                  <a:srgbClr val="000000"/>
+                </a:solidFill>
+                <a:latin typeface="Arial"/>
+                <a:ea typeface="DejaVu Sans"/>
+              </a:rPr>
+              <a:t>Motor temp has been switched out for motor torque.</a:t>
+            </a:r>
+            <a:endParaRPr/>
+          </a:p>
+          <a:p>
+            <a:pPr>
+              <a:lnSpc>
+                <a:spcPct val="100000"/>
+              </a:lnSpc>
+            </a:pPr>
+            <a:endParaRPr/>
+          </a:p>
+          <a:p>
+            <a:pPr>
+              <a:lnSpc>
+                <a:spcPct val="100000"/>
+              </a:lnSpc>
+              <a:buFont typeface="Arial"/>
+              <a:buChar char="•"/>
+            </a:pPr>
+            <a:r>
+              <a:rPr lang="en-US" sz="2000">
+                <a:solidFill>
+                  <a:srgbClr val="000000"/>
+                </a:solidFill>
+                <a:latin typeface="Arial"/>
+                <a:ea typeface="DejaVu Sans"/>
+              </a:rPr>
+              <a:t>Still debugging battery level potentiometer.</a:t>
+            </a:r>
+            <a:endParaRPr/>
+          </a:p>
+          <a:p>
+            <a:pPr>
+              <a:lnSpc>
+                <a:spcPct val="100000"/>
+              </a:lnSpc>
             </a:pPr>
             <a:endParaRPr/>
           </a:p>
@@ -6633,7 +5344,7 @@
       </p:sp>
       <p:pic>
         <p:nvPicPr>
-          <p:cNvPr id="165" name="Picture 2" descr=""/>
+          <p:cNvPr id="128" name="Picture 3" descr=""/>
           <p:cNvPicPr/>
           <p:nvPr/>
         </p:nvPicPr>
@@ -6645,8 +5356,8 @@
         </p:blipFill>
         <p:spPr>
           <a:xfrm>
-            <a:off x="5485320" y="580320"/>
-            <a:ext cx="6329160" cy="4746960"/>
+            <a:off x="6885720" y="3002760"/>
+            <a:ext cx="4842360" cy="2723400"/>
           </a:xfrm>
           <a:prstGeom prst="rect">
             <a:avLst/>
@@ -6707,14 +5418,14 @@
       </p:grpSpPr>
       <p:sp>
         <p:nvSpPr>
-          <p:cNvPr id="166" name="CustomShape 1"/>
+          <p:cNvPr id="129" name="CustomShape 1"/>
           <p:cNvSpPr/>
           <p:nvPr/>
         </p:nvSpPr>
         <p:spPr>
           <a:xfrm>
-            <a:off x="609480" y="274680"/>
-            <a:ext cx="10972080" cy="1142280"/>
+            <a:off x="609480" y="94320"/>
+            <a:ext cx="10971720" cy="1141920"/>
           </a:xfrm>
           <a:prstGeom prst="rect">
             <a:avLst/>
@@ -6740,22 +5451,22 @@
                 <a:latin typeface="Arial"/>
                 <a:ea typeface="MS PGothic"/>
               </a:rPr>
-              <a:t>Electric Vehicle Update</a:t>
-            </a:r>
-            <a:endParaRPr/>
-          </a:p>
-        </p:txBody>
-      </p:sp>
-      <p:sp>
-        <p:nvSpPr>
-          <p:cNvPr id="167" name="CustomShape 2"/>
+              <a:t>Report and Poster</a:t>
+            </a:r>
+            <a:endParaRPr/>
+          </a:p>
+        </p:txBody>
+      </p:sp>
+      <p:sp>
+        <p:nvSpPr>
+          <p:cNvPr id="130" name="CustomShape 2"/>
           <p:cNvSpPr/>
           <p:nvPr/>
         </p:nvSpPr>
         <p:spPr>
           <a:xfrm>
-            <a:off x="6193080" y="777960"/>
-            <a:ext cx="5388480" cy="639000"/>
+            <a:off x="609480" y="1236960"/>
+            <a:ext cx="6275520" cy="1004760"/>
           </a:xfrm>
           <a:prstGeom prst="rect">
             <a:avLst/>
@@ -6766,56 +5477,7 @@
           </a:ln>
         </p:spPr>
         <p:txBody>
-          <a:bodyPr lIns="90000" rIns="90000" tIns="46800" bIns="46800" anchor="b"/>
-          <a:p>
-            <a:pPr algn="ctr">
-              <a:lnSpc>
-                <a:spcPct val="100000"/>
-              </a:lnSpc>
-            </a:pPr>
-            <a:r>
-              <a:rPr b="1" lang="en-US" sz="2400">
-                <a:solidFill>
-                  <a:srgbClr val="000000"/>
-                </a:solidFill>
-                <a:latin typeface="Arial"/>
-                <a:ea typeface="MS PGothic"/>
-              </a:rPr>
-              <a:t>In Progress</a:t>
-            </a:r>
-            <a:endParaRPr/>
-          </a:p>
-        </p:txBody>
-      </p:sp>
-      <p:sp>
-        <p:nvSpPr>
-          <p:cNvPr id="168" name="CustomShape 3"/>
-          <p:cNvSpPr/>
-          <p:nvPr/>
-        </p:nvSpPr>
-        <p:spPr>
-          <a:xfrm>
-            <a:off x="6193440" y="1550880"/>
-            <a:ext cx="5388480" cy="4294440"/>
-          </a:xfrm>
-          <a:prstGeom prst="rect">
-            <a:avLst/>
-          </a:prstGeom>
-          <a:noFill/>
-          <a:ln>
-            <a:noFill/>
-          </a:ln>
-        </p:spPr>
-        <p:txBody>
-          <a:bodyPr lIns="90000" rIns="90000" tIns="46800" bIns="46800"/>
-          <a:p>
-            <a:pPr>
-              <a:lnSpc>
-                <a:spcPct val="100000"/>
-              </a:lnSpc>
-            </a:pPr>
-            <a:endParaRPr/>
-          </a:p>
+          <a:bodyPr lIns="90000" rIns="90000" tIns="45000" bIns="45000"/>
           <a:p>
             <a:pPr>
               <a:lnSpc>
@@ -6825,23 +5487,15 @@
               <a:buChar char="•"/>
             </a:pPr>
             <a:r>
-              <a:rPr lang="en-US" sz="2400">
+              <a:rPr lang="en-US" sz="2000">
                 <a:solidFill>
                   <a:srgbClr val="000000"/>
                 </a:solidFill>
                 <a:latin typeface="Arial"/>
-                <a:ea typeface="MS PGothic"/>
-              </a:rPr>
-              <a:t>The old car is still in pieces.</a:t>
-            </a:r>
-            <a:endParaRPr/>
-          </a:p>
-          <a:p>
-            <a:pPr>
-              <a:lnSpc>
-                <a:spcPct val="100000"/>
-              </a:lnSpc>
-            </a:pPr>
+                <a:ea typeface="DejaVu Sans"/>
+              </a:rPr>
+              <a:t>Updated solution section on report.</a:t>
+            </a:r>
             <a:endParaRPr/>
           </a:p>
           <a:p>
@@ -6852,16 +5506,6 @@
               <a:buFont typeface="Arial"/>
               <a:buChar char="•"/>
             </a:pPr>
-            <a:r>
-              <a:rPr lang="en-US" sz="2400">
-                <a:solidFill>
-                  <a:srgbClr val="000000"/>
-                </a:solidFill>
-                <a:latin typeface="Arial"/>
-                <a:ea typeface="MS PGothic"/>
-              </a:rPr>
-              <a:t>The new frame is still being put together.</a:t>
-            </a:r>
             <a:endParaRPr/>
           </a:p>
           <a:p>
@@ -6872,6 +5516,16 @@
               <a:buFont typeface="Arial"/>
               <a:buChar char="•"/>
             </a:pPr>
+            <a:r>
+              <a:rPr lang="en-US" sz="2000">
+                <a:solidFill>
+                  <a:srgbClr val="000000"/>
+                </a:solidFill>
+                <a:latin typeface="Arial"/>
+                <a:ea typeface="DejaVu Sans"/>
+              </a:rPr>
+              <a:t>Added more to the poster.</a:t>
+            </a:r>
             <a:endParaRPr/>
           </a:p>
           <a:p>
@@ -6882,15 +5536,25 @@
               <a:buFont typeface="Arial"/>
               <a:buChar char="•"/>
             </a:pPr>
-            <a:r>
-              <a:rPr lang="en-US" sz="2400">
+            <a:endParaRPr/>
+          </a:p>
+          <a:p>
+            <a:pPr>
+              <a:lnSpc>
+                <a:spcPct val="100000"/>
+              </a:lnSpc>
+              <a:buFont typeface="Arial"/>
+              <a:buChar char="•"/>
+            </a:pPr>
+            <a:r>
+              <a:rPr lang="en-US" sz="2000">
                 <a:solidFill>
                   <a:srgbClr val="000000"/>
                 </a:solidFill>
                 <a:latin typeface="Arial"/>
-                <a:ea typeface="MS PGothic"/>
-              </a:rPr>
-              <a:t>Progress is slow to happen.</a:t>
+                <a:ea typeface="DejaVu Sans"/>
+              </a:rPr>
+              <a:t>Will continue to update as we go.</a:t>
             </a:r>
             <a:endParaRPr/>
           </a:p>
@@ -6902,11 +5566,19 @@
             </a:pPr>
             <a:endParaRPr/>
           </a:p>
+          <a:p>
+            <a:pPr>
+              <a:lnSpc>
+                <a:spcPct val="100000"/>
+              </a:lnSpc>
+            </a:pPr>
+            <a:endParaRPr/>
+          </a:p>
         </p:txBody>
       </p:sp>
       <p:pic>
         <p:nvPicPr>
-          <p:cNvPr id="169" name="Picture 2" descr=""/>
+          <p:cNvPr id="131" name="Picture 2" descr=""/>
           <p:cNvPicPr/>
           <p:nvPr/>
         </p:nvPicPr>
@@ -6918,8 +5590,8 @@
         </p:blipFill>
         <p:spPr>
           <a:xfrm>
-            <a:off x="1219320" y="1271880"/>
-            <a:ext cx="3430080" cy="4573440"/>
+            <a:off x="5485320" y="580320"/>
+            <a:ext cx="6328800" cy="4746600"/>
           </a:xfrm>
           <a:prstGeom prst="rect">
             <a:avLst/>
@@ -6964,6 +5636,277 @@
 <file path=ppt/slides/slide5.xml><?xml version="1.0" encoding="utf-8"?>
 <p:sld xmlns:a="http://schemas.openxmlformats.org/drawingml/2006/main" xmlns:p="http://schemas.openxmlformats.org/presentationml/2006/main" xmlns:r="http://schemas.openxmlformats.org/officeDocument/2006/relationships">
   <p:cSld>
+    <p:spTree>
+      <p:nvGrpSpPr>
+        <p:cNvPr id="1" name=""/>
+        <p:cNvGrpSpPr/>
+        <p:nvPr/>
+      </p:nvGrpSpPr>
+      <p:grpSpPr>
+        <a:xfrm>
+          <a:off x="0" y="0"/>
+          <a:ext cx="0" cy="0"/>
+          <a:chOff x="0" y="0"/>
+          <a:chExt cx="0" cy="0"/>
+        </a:xfrm>
+      </p:grpSpPr>
+      <p:sp>
+        <p:nvSpPr>
+          <p:cNvPr id="132" name="CustomShape 1"/>
+          <p:cNvSpPr/>
+          <p:nvPr/>
+        </p:nvSpPr>
+        <p:spPr>
+          <a:xfrm>
+            <a:off x="609480" y="274680"/>
+            <a:ext cx="10971720" cy="1141920"/>
+          </a:xfrm>
+          <a:prstGeom prst="rect">
+            <a:avLst/>
+          </a:prstGeom>
+          <a:noFill/>
+          <a:ln>
+            <a:noFill/>
+          </a:ln>
+        </p:spPr>
+        <p:txBody>
+          <a:bodyPr lIns="90000" rIns="90000" tIns="46800" bIns="46800" anchor="ctr"/>
+          <a:p>
+            <a:pPr>
+              <a:lnSpc>
+                <a:spcPct val="100000"/>
+              </a:lnSpc>
+            </a:pPr>
+            <a:r>
+              <a:rPr b="1" lang="en-US" sz="2800">
+                <a:solidFill>
+                  <a:srgbClr val="24459c"/>
+                </a:solidFill>
+                <a:latin typeface="Arial"/>
+                <a:ea typeface="MS PGothic"/>
+              </a:rPr>
+              <a:t>Electric Vehicle Update</a:t>
+            </a:r>
+            <a:endParaRPr/>
+          </a:p>
+        </p:txBody>
+      </p:sp>
+      <p:sp>
+        <p:nvSpPr>
+          <p:cNvPr id="133" name="CustomShape 2"/>
+          <p:cNvSpPr/>
+          <p:nvPr/>
+        </p:nvSpPr>
+        <p:spPr>
+          <a:xfrm>
+            <a:off x="6193080" y="777960"/>
+            <a:ext cx="5388120" cy="638640"/>
+          </a:xfrm>
+          <a:prstGeom prst="rect">
+            <a:avLst/>
+          </a:prstGeom>
+          <a:noFill/>
+          <a:ln>
+            <a:noFill/>
+          </a:ln>
+        </p:spPr>
+        <p:txBody>
+          <a:bodyPr lIns="90000" rIns="90000" tIns="46800" bIns="46800" anchor="b"/>
+          <a:p>
+            <a:pPr algn="ctr">
+              <a:lnSpc>
+                <a:spcPct val="100000"/>
+              </a:lnSpc>
+            </a:pPr>
+            <a:r>
+              <a:rPr b="1" lang="en-US" sz="2400">
+                <a:solidFill>
+                  <a:srgbClr val="000000"/>
+                </a:solidFill>
+                <a:latin typeface="Arial"/>
+                <a:ea typeface="MS PGothic"/>
+              </a:rPr>
+              <a:t>In Progress</a:t>
+            </a:r>
+            <a:endParaRPr/>
+          </a:p>
+        </p:txBody>
+      </p:sp>
+      <p:sp>
+        <p:nvSpPr>
+          <p:cNvPr id="134" name="CustomShape 3"/>
+          <p:cNvSpPr/>
+          <p:nvPr/>
+        </p:nvSpPr>
+        <p:spPr>
+          <a:xfrm>
+            <a:off x="6193440" y="1550880"/>
+            <a:ext cx="5388120" cy="4294080"/>
+          </a:xfrm>
+          <a:prstGeom prst="rect">
+            <a:avLst/>
+          </a:prstGeom>
+          <a:noFill/>
+          <a:ln>
+            <a:noFill/>
+          </a:ln>
+        </p:spPr>
+        <p:txBody>
+          <a:bodyPr lIns="90000" rIns="90000" tIns="46800" bIns="46800"/>
+          <a:p>
+            <a:pPr>
+              <a:lnSpc>
+                <a:spcPct val="100000"/>
+              </a:lnSpc>
+            </a:pPr>
+            <a:endParaRPr/>
+          </a:p>
+          <a:p>
+            <a:pPr>
+              <a:lnSpc>
+                <a:spcPct val="100000"/>
+              </a:lnSpc>
+              <a:buFont typeface="Arial"/>
+              <a:buChar char="•"/>
+            </a:pPr>
+            <a:r>
+              <a:rPr lang="en-US" sz="2400">
+                <a:solidFill>
+                  <a:srgbClr val="000000"/>
+                </a:solidFill>
+                <a:latin typeface="Arial"/>
+                <a:ea typeface="MS PGothic"/>
+              </a:rPr>
+              <a:t>The old car is still in pieces.</a:t>
+            </a:r>
+            <a:endParaRPr/>
+          </a:p>
+          <a:p>
+            <a:pPr>
+              <a:lnSpc>
+                <a:spcPct val="100000"/>
+              </a:lnSpc>
+            </a:pPr>
+            <a:endParaRPr/>
+          </a:p>
+          <a:p>
+            <a:pPr>
+              <a:lnSpc>
+                <a:spcPct val="100000"/>
+              </a:lnSpc>
+              <a:buFont typeface="Arial"/>
+              <a:buChar char="•"/>
+            </a:pPr>
+            <a:r>
+              <a:rPr lang="en-US" sz="2400">
+                <a:solidFill>
+                  <a:srgbClr val="000000"/>
+                </a:solidFill>
+                <a:latin typeface="Arial"/>
+                <a:ea typeface="MS PGothic"/>
+              </a:rPr>
+              <a:t>The new frame is still being put together.</a:t>
+            </a:r>
+            <a:endParaRPr/>
+          </a:p>
+          <a:p>
+            <a:pPr>
+              <a:lnSpc>
+                <a:spcPct val="100000"/>
+              </a:lnSpc>
+            </a:pPr>
+            <a:endParaRPr/>
+          </a:p>
+          <a:p>
+            <a:pPr>
+              <a:lnSpc>
+                <a:spcPct val="100000"/>
+              </a:lnSpc>
+              <a:buFont typeface="Arial"/>
+              <a:buChar char="•"/>
+            </a:pPr>
+            <a:r>
+              <a:rPr lang="en-US" sz="2400">
+                <a:solidFill>
+                  <a:srgbClr val="000000"/>
+                </a:solidFill>
+                <a:latin typeface="Arial"/>
+                <a:ea typeface="MS PGothic"/>
+              </a:rPr>
+              <a:t>Progress is slow to happen.</a:t>
+            </a:r>
+            <a:endParaRPr/>
+          </a:p>
+          <a:p>
+            <a:pPr>
+              <a:lnSpc>
+                <a:spcPct val="100000"/>
+              </a:lnSpc>
+            </a:pPr>
+            <a:endParaRPr/>
+          </a:p>
+        </p:txBody>
+      </p:sp>
+      <p:pic>
+        <p:nvPicPr>
+          <p:cNvPr id="135" name="Picture 2" descr=""/>
+          <p:cNvPicPr/>
+          <p:nvPr/>
+        </p:nvPicPr>
+        <p:blipFill>
+          <a:blip r:embed="rId1"/>
+          <a:stretch>
+            <a:fillRect/>
+          </a:stretch>
+        </p:blipFill>
+        <p:spPr>
+          <a:xfrm>
+            <a:off x="1219320" y="1271880"/>
+            <a:ext cx="3429720" cy="4573080"/>
+          </a:xfrm>
+          <a:prstGeom prst="rect">
+            <a:avLst/>
+          </a:prstGeom>
+          <a:ln>
+            <a:noFill/>
+          </a:ln>
+        </p:spPr>
+      </p:pic>
+    </p:spTree>
+  </p:cSld>
+  <p:timing>
+    <p:tnLst>
+      <p:par>
+        <p:cTn id="9" dur="indefinite" restart="never" nodeType="tmRoot">
+          <p:childTnLst>
+            <p:seq>
+              <p:cTn id="10" nodeType="mainSeq"/>
+              <p:prevCondLst>
+                <p:cond delay="0" evt="onPrev">
+                  <p:tgtEl>
+                    <p:sldTgt/>
+                  </p:tgtEl>
+                </p:cond>
+              </p:prevCondLst>
+              <p:nextCondLst>
+                <p:cond delay="0" evt="onNext">
+                  <p:tgtEl>
+                    <p:sldTgt/>
+                  </p:tgtEl>
+                </p:cond>
+              </p:nextCondLst>
+            </p:seq>
+          </p:childTnLst>
+        </p:cTn>
+      </p:par>
+    </p:tnLst>
+  </p:timing>
+</p:sld>
+</file>
+
+<file path=ppt/slides/slide6.xml><?xml version="1.0" encoding="utf-8"?>
+<p:sld xmlns:a="http://schemas.openxmlformats.org/drawingml/2006/main" xmlns:p="http://schemas.openxmlformats.org/presentationml/2006/main" xmlns:r="http://schemas.openxmlformats.org/officeDocument/2006/relationships">
+  <p:cSld>
     <p:bg>
       <p:bgPr>
         <a:solidFill>
@@ -6987,14 +5930,14 @@
       </p:grpSpPr>
       <p:sp>
         <p:nvSpPr>
-          <p:cNvPr id="170" name="CustomShape 1"/>
+          <p:cNvPr id="136" name="CustomShape 1"/>
           <p:cNvSpPr/>
           <p:nvPr/>
         </p:nvSpPr>
         <p:spPr>
           <a:xfrm>
             <a:off x="1523880" y="714240"/>
-            <a:ext cx="9143280" cy="653400"/>
+            <a:ext cx="9142920" cy="653040"/>
           </a:xfrm>
           <a:prstGeom prst="rect">
             <a:avLst/>
@@ -7028,14 +5971,14 @@
       </p:sp>
       <p:sp>
         <p:nvSpPr>
-          <p:cNvPr id="171" name="CustomShape 2"/>
+          <p:cNvPr id="137" name="CustomShape 2"/>
           <p:cNvSpPr/>
           <p:nvPr/>
         </p:nvSpPr>
         <p:spPr>
           <a:xfrm>
             <a:off x="1046880" y="1295280"/>
-            <a:ext cx="9505080" cy="4876200"/>
+            <a:ext cx="9504720" cy="4875840"/>
           </a:xfrm>
           <a:prstGeom prst="rect">
             <a:avLst/>
@@ -7048,14 +5991,14 @@
       </p:sp>
       <p:sp>
         <p:nvSpPr>
-          <p:cNvPr id="172" name="CustomShape 3"/>
+          <p:cNvPr id="138" name="CustomShape 3"/>
           <p:cNvSpPr/>
           <p:nvPr/>
         </p:nvSpPr>
         <p:spPr>
           <a:xfrm>
             <a:off x="771480" y="1368000"/>
-            <a:ext cx="9053640" cy="5272200"/>
+            <a:ext cx="9053280" cy="5271840"/>
           </a:xfrm>
           <a:prstGeom prst="rect">
             <a:avLst/>
@@ -7122,7 +6065,7 @@
                 <a:latin typeface="Arial"/>
                 <a:ea typeface="DejaVu Sans"/>
               </a:rPr>
-              <a:t>potentiometers working on the current iteration of the demo board.</a:t>
+              <a:t>potentiometers working on the current iteration demo software.</a:t>
             </a:r>
             <a:endParaRPr/>
           </a:p>
@@ -7150,7 +6093,7 @@
                 <a:latin typeface="Arial"/>
                 <a:ea typeface="MS PGothic"/>
               </a:rPr>
-              <a:t>- </a:t>
+              <a:t>- Debug custom board as parts come in. </a:t>
             </a:r>
             <a:endParaRPr/>
           </a:p>
@@ -7217,7 +6160,7 @@
                 <a:latin typeface="Arial"/>
                 <a:ea typeface="MS PGothic"/>
               </a:rPr>
-              <a:t>- On hold until we decide on PCB vs Due</a:t>
+              <a:t>- On hold until we decide on PCB vs Due.</a:t>
             </a:r>
             <a:endParaRPr/>
           </a:p>
@@ -7330,7 +6273,7 @@
                 <a:latin typeface="Arial"/>
                 <a:ea typeface="MS PGothic"/>
               </a:rPr>
-              <a:t>- Update wiki with information about the demo board</a:t>
+              <a:t>- Update wiki to fit Michal's wants.</a:t>
             </a:r>
             <a:endParaRPr/>
           </a:p>
@@ -7434,10 +6377,10 @@
   <p:timing>
     <p:tnLst>
       <p:par>
-        <p:cTn id="9" dur="indefinite" restart="never" nodeType="tmRoot">
+        <p:cTn id="11" dur="indefinite" restart="never" nodeType="tmRoot">
           <p:childTnLst>
             <p:seq>
-              <p:cTn id="10" dur="indefinite" nodeType="mainSeq"/>
+              <p:cTn id="12" dur="indefinite" nodeType="mainSeq"/>
               <p:prevCondLst>
                 <p:cond delay="0" evt="onPrev">
                   <p:tgtEl>
@@ -8351,227 +7294,4 @@
     </a:fmtScheme>
   </a:themeElements>
 </a:theme>
-</file>
-
-<file path=ppt/theme/theme5.xml><?xml version="1.0" encoding="utf-8"?>
-<a:theme xmlns:a="http://schemas.openxmlformats.org/drawingml/2006/main" name="Office Theme">
-  <a:themeElements>
-    <a:clrScheme name="Office">
-      <a:dk1>
-        <a:sysClr val="windowText" lastClr="000000"/>
-      </a:dk1>
-      <a:lt1>
-        <a:sysClr val="window" lastClr="FFFFFF"/>
-      </a:lt1>
-      <a:dk2>
-        <a:srgbClr val="1F497D"/>
-      </a:dk2>
-      <a:lt2>
-        <a:srgbClr val="EEECE1"/>
-      </a:lt2>
-      <a:accent1>
-        <a:srgbClr val="4F81BD"/>
-      </a:accent1>
-      <a:accent2>
-        <a:srgbClr val="C0504D"/>
-      </a:accent2>
-      <a:accent3>
-        <a:srgbClr val="9BBB59"/>
-      </a:accent3>
-      <a:accent4>
-        <a:srgbClr val="8064A2"/>
-      </a:accent4>
-      <a:accent5>
-        <a:srgbClr val="4BACC6"/>
-      </a:accent5>
-      <a:accent6>
-        <a:srgbClr val="F79646"/>
-      </a:accent6>
-      <a:hlink>
-        <a:srgbClr val="0000FF"/>
-      </a:hlink>
-      <a:folHlink>
-        <a:srgbClr val="800080"/>
-      </a:folHlink>
-    </a:clrScheme>
-    <a:fontScheme name="Office">
-      <a:majorFont>
-        <a:latin typeface="Arial"/>
-        <a:ea typeface="DejaVu Sans"/>
-        <a:cs typeface="DejaVu Sans"/>
-      </a:majorFont>
-      <a:minorFont>
-        <a:latin typeface="Arial"/>
-        <a:ea typeface="DejaVu Sans"/>
-        <a:cs typeface="DejaVu Sans"/>
-      </a:minorFont>
-    </a:fontScheme>
-    <a:fmtScheme name="Office">
-      <a:fillStyleLst>
-        <a:solidFill>
-          <a:schemeClr val="phClr"/>
-        </a:solidFill>
-        <a:gradFill rotWithShape="1">
-          <a:gsLst>
-            <a:gs pos="0">
-              <a:schemeClr val="phClr">
-                <a:tint val="50000"/>
-                <a:satMod val="300000"/>
-              </a:schemeClr>
-            </a:gs>
-            <a:gs pos="35000">
-              <a:schemeClr val="phClr">
-                <a:tint val="37000"/>
-                <a:satMod val="300000"/>
-              </a:schemeClr>
-            </a:gs>
-            <a:gs pos="100000">
-              <a:schemeClr val="phClr">
-                <a:tint val="15000"/>
-                <a:satMod val="350000"/>
-              </a:schemeClr>
-            </a:gs>
-          </a:gsLst>
-          <a:lin ang="16200000" scaled="1"/>
-        </a:gradFill>
-        <a:gradFill rotWithShape="1">
-          <a:gsLst>
-            <a:gs pos="0">
-              <a:schemeClr val="phClr">
-                <a:shade val="51000"/>
-                <a:satMod val="130000"/>
-              </a:schemeClr>
-            </a:gs>
-            <a:gs pos="80000">
-              <a:schemeClr val="phClr">
-                <a:shade val="93000"/>
-                <a:satMod val="130000"/>
-              </a:schemeClr>
-            </a:gs>
-            <a:gs pos="100000">
-              <a:schemeClr val="phClr">
-                <a:shade val="94000"/>
-                <a:satMod val="135000"/>
-              </a:schemeClr>
-            </a:gs>
-          </a:gsLst>
-          <a:lin ang="16200000" scaled="0"/>
-        </a:gradFill>
-      </a:fillStyleLst>
-      <a:lnStyleLst>
-        <a:ln w="9525" cap="flat" cmpd="sng" algn="ctr">
-          <a:solidFill>
-            <a:schemeClr val="phClr">
-              <a:shade val="95000"/>
-              <a:satMod val="105000"/>
-            </a:schemeClr>
-          </a:solidFill>
-          <a:prstDash val="solid"/>
-        </a:ln>
-        <a:ln w="25400" cap="flat" cmpd="sng" algn="ctr">
-          <a:solidFill>
-            <a:schemeClr val="phClr"/>
-          </a:solidFill>
-          <a:prstDash val="solid"/>
-        </a:ln>
-        <a:ln w="38100" cap="flat" cmpd="sng" algn="ctr">
-          <a:solidFill>
-            <a:schemeClr val="phClr"/>
-          </a:solidFill>
-          <a:prstDash val="solid"/>
-        </a:ln>
-      </a:lnStyleLst>
-      <a:effectStyleLst>
-        <a:effectStyle>
-          <a:effectLst>
-            <a:outerShdw blurRad="40000" dist="20000" dir="5400000" rotWithShape="0">
-              <a:srgbClr val="000000">
-                <a:alpha val="38000"/>
-              </a:srgbClr>
-            </a:outerShdw>
-          </a:effectLst>
-        </a:effectStyle>
-        <a:effectStyle>
-          <a:effectLst>
-            <a:outerShdw blurRad="40000" dist="23000" dir="5400000" rotWithShape="0">
-              <a:srgbClr val="000000">
-                <a:alpha val="35000"/>
-              </a:srgbClr>
-            </a:outerShdw>
-          </a:effectLst>
-        </a:effectStyle>
-        <a:effectStyle>
-          <a:effectLst>
-            <a:outerShdw blurRad="40000" dist="23000" dir="5400000" rotWithShape="0">
-              <a:srgbClr val="000000">
-                <a:alpha val="35000"/>
-              </a:srgbClr>
-            </a:outerShdw>
-          </a:effectLst>
-          <a:scene3d>
-            <a:camera prst="orthographicFront">
-              <a:rot lat="0" lon="0" rev="0"/>
-            </a:camera>
-            <a:lightRig rig="threePt" dir="t">
-              <a:rot lat="0" lon="0" rev="1200000"/>
-            </a:lightRig>
-          </a:scene3d>
-          <a:sp3d>
-            <a:bevelT w="63500" h="25400"/>
-          </a:sp3d>
-        </a:effectStyle>
-      </a:effectStyleLst>
-      <a:bgFillStyleLst>
-        <a:solidFill>
-          <a:schemeClr val="phClr"/>
-        </a:solidFill>
-        <a:gradFill rotWithShape="1">
-          <a:gsLst>
-            <a:gs pos="0">
-              <a:schemeClr val="phClr">
-                <a:tint val="40000"/>
-                <a:satMod val="350000"/>
-              </a:schemeClr>
-            </a:gs>
-            <a:gs pos="40000">
-              <a:schemeClr val="phClr">
-                <a:tint val="45000"/>
-                <a:shade val="99000"/>
-                <a:satMod val="350000"/>
-              </a:schemeClr>
-            </a:gs>
-            <a:gs pos="100000">
-              <a:schemeClr val="phClr">
-                <a:shade val="20000"/>
-                <a:satMod val="255000"/>
-              </a:schemeClr>
-            </a:gs>
-          </a:gsLst>
-          <a:path path="circle">
-            <a:fillToRect l="50000" t="-80000" r="50000" b="180000"/>
-          </a:path>
-        </a:gradFill>
-        <a:gradFill rotWithShape="1">
-          <a:gsLst>
-            <a:gs pos="0">
-              <a:schemeClr val="phClr">
-                <a:tint val="80000"/>
-                <a:satMod val="300000"/>
-              </a:schemeClr>
-            </a:gs>
-            <a:gs pos="100000">
-              <a:schemeClr val="phClr">
-                <a:shade val="30000"/>
-                <a:satMod val="200000"/>
-              </a:schemeClr>
-            </a:gs>
-          </a:gsLst>
-          <a:path path="circle">
-            <a:fillToRect l="50000" t="50000" r="50000" b="50000"/>
-          </a:path>
-        </a:gradFill>
-      </a:bgFillStyleLst>
-    </a:fmtScheme>
-  </a:themeElements>
-</a:theme>
 </file>
</xml_diff>